<commit_message>
Final project docs and code submission- 08
</commit_message>
<xml_diff>
--- a/PCS24-8-Aakriti/Presentation pentackles major project.pptx
+++ b/PCS24-8-Aakriti/Presentation pentackles major project.pptx
@@ -5,7 +5,7 @@
     <p:sldMasterId id="2147483648" r:id="rId1"/>
   </p:sldMasterIdLst>
   <p:notesMasterIdLst>
-    <p:notesMasterId r:id="rId27"/>
+    <p:notesMasterId r:id="rId31"/>
   </p:notesMasterIdLst>
   <p:sldIdLst>
     <p:sldId id="256" r:id="rId2"/>
@@ -24,15 +24,19 @@
     <p:sldId id="260" r:id="rId15"/>
     <p:sldId id="281" r:id="rId16"/>
     <p:sldId id="266" r:id="rId17"/>
-    <p:sldId id="269" r:id="rId18"/>
-    <p:sldId id="289" r:id="rId19"/>
-    <p:sldId id="270" r:id="rId20"/>
-    <p:sldId id="286" r:id="rId21"/>
-    <p:sldId id="288" r:id="rId22"/>
-    <p:sldId id="287" r:id="rId23"/>
-    <p:sldId id="285" r:id="rId24"/>
-    <p:sldId id="280" r:id="rId25"/>
-    <p:sldId id="265" r:id="rId26"/>
+    <p:sldId id="289" r:id="rId18"/>
+    <p:sldId id="269" r:id="rId19"/>
+    <p:sldId id="291" r:id="rId20"/>
+    <p:sldId id="292" r:id="rId21"/>
+    <p:sldId id="293" r:id="rId22"/>
+    <p:sldId id="294" r:id="rId23"/>
+    <p:sldId id="297" r:id="rId24"/>
+    <p:sldId id="270" r:id="rId25"/>
+    <p:sldId id="299" r:id="rId26"/>
+    <p:sldId id="290" r:id="rId27"/>
+    <p:sldId id="298" r:id="rId28"/>
+    <p:sldId id="296" r:id="rId29"/>
+    <p:sldId id="265" r:id="rId30"/>
   </p:sldIdLst>
   <p:sldSz cx="12192000" cy="6858000"/>
   <p:notesSz cx="6858000" cy="9144000"/>
@@ -132,65 +136,48 @@
     </a:lvl9pPr>
   </p:defaultTextStyle>
   <p:extLst>
+    <p:ext uri="{521415D9-36F7-43E2-AB2F-B90AF26B5E84}">
+      <p14:sectionLst xmlns:p14="http://schemas.microsoft.com/office/powerpoint/2010/main">
+        <p14:section name="Default Section" id="{AAB5C288-39BF-47BE-840C-FD2A6A6ADCBC}">
+          <p14:sldIdLst>
+            <p14:sldId id="256"/>
+            <p14:sldId id="257"/>
+            <p14:sldId id="258"/>
+            <p14:sldId id="259"/>
+            <p14:sldId id="284"/>
+            <p14:sldId id="274"/>
+            <p14:sldId id="275"/>
+            <p14:sldId id="271"/>
+            <p14:sldId id="272"/>
+            <p14:sldId id="276"/>
+            <p14:sldId id="277"/>
+            <p14:sldId id="278"/>
+            <p14:sldId id="279"/>
+            <p14:sldId id="260"/>
+            <p14:sldId id="281"/>
+            <p14:sldId id="266"/>
+            <p14:sldId id="289"/>
+            <p14:sldId id="269"/>
+            <p14:sldId id="291"/>
+            <p14:sldId id="292"/>
+            <p14:sldId id="293"/>
+            <p14:sldId id="294"/>
+            <p14:sldId id="297"/>
+            <p14:sldId id="270"/>
+            <p14:sldId id="299"/>
+            <p14:sldId id="290"/>
+            <p14:sldId id="298"/>
+            <p14:sldId id="296"/>
+            <p14:sldId id="265"/>
+          </p14:sldIdLst>
+        </p14:section>
+      </p14:sectionLst>
+    </p:ext>
     <p:ext uri="{EFAFB233-063F-42B5-8137-9DF3F51BA10A}">
       <p15:sldGuideLst xmlns:p15="http://schemas.microsoft.com/office/powerpoint/2012/main"/>
     </p:ext>
   </p:extLst>
 </p:presentation>
-</file>
-
-<file path=ppt/ink/ink1.xml><?xml version="1.0" encoding="utf-8"?>
-<inkml:ink xmlns:inkml="http://www.w3.org/2003/InkML">
-  <inkml:definitions>
-    <inkml:context xml:id="ctx0">
-      <inkml:inkSource xml:id="inkSrc0">
-        <inkml:traceFormat>
-          <inkml:channel name="X" type="integer" min="-2.14748E9" max="2.14748E9" units="cm"/>
-          <inkml:channel name="Y" type="integer" min="-2.14748E9" max="2.14748E9" units="cm"/>
-          <inkml:channel name="F" type="integer" max="32767" units="dev"/>
-        </inkml:traceFormat>
-        <inkml:channelProperties>
-          <inkml:channelProperty channel="X" name="resolution" value="1000" units="1/cm"/>
-          <inkml:channelProperty channel="Y" name="resolution" value="1000" units="1/cm"/>
-          <inkml:channelProperty channel="F" name="resolution" value="0" units="1/dev"/>
-        </inkml:channelProperties>
-      </inkml:inkSource>
-      <inkml:timestamp xml:id="ts0" timeString="2023-10-31T16:20:03.312"/>
-    </inkml:context>
-    <inkml:brush xml:id="br0">
-      <inkml:brushProperty name="width" value="0.05" units="cm"/>
-      <inkml:brushProperty name="height" value="0.05" units="cm"/>
-    </inkml:brush>
-  </inkml:definitions>
-  <inkml:trace contextRef="#ctx0" brushRef="#br0">1 0 24575,'0'0'-8191</inkml:trace>
-</inkml:ink>
-</file>
-
-<file path=ppt/ink/ink2.xml><?xml version="1.0" encoding="utf-8"?>
-<inkml:ink xmlns:inkml="http://www.w3.org/2003/InkML">
-  <inkml:definitions>
-    <inkml:context xml:id="ctx0">
-      <inkml:inkSource xml:id="inkSrc0">
-        <inkml:traceFormat>
-          <inkml:channel name="X" type="integer" min="-2.14748E9" max="2.14748E9" units="cm"/>
-          <inkml:channel name="Y" type="integer" min="-2.14748E9" max="2.14748E9" units="cm"/>
-          <inkml:channel name="F" type="integer" max="32767" units="dev"/>
-        </inkml:traceFormat>
-        <inkml:channelProperties>
-          <inkml:channelProperty channel="X" name="resolution" value="1000" units="1/cm"/>
-          <inkml:channelProperty channel="Y" name="resolution" value="1000" units="1/cm"/>
-          <inkml:channelProperty channel="F" name="resolution" value="0" units="1/dev"/>
-        </inkml:channelProperties>
-      </inkml:inkSource>
-      <inkml:timestamp xml:id="ts0" timeString="2023-10-31T16:20:13.442"/>
-    </inkml:context>
-    <inkml:brush xml:id="br0">
-      <inkml:brushProperty name="width" value="0.05" units="cm"/>
-      <inkml:brushProperty name="height" value="0.05" units="cm"/>
-    </inkml:brush>
-  </inkml:definitions>
-  <inkml:trace contextRef="#ctx0" brushRef="#br0">1 1 24575,'0'0'-8191</inkml:trace>
-</inkml:ink>
 </file>
 
 <file path=ppt/notesMasters/notesMaster1.xml><?xml version="1.0" encoding="utf-8"?>
@@ -275,7 +262,7 @@
           <a:p>
             <a:fld id="{E13B6DE8-89EB-4910-BE6E-A1D1FF0DA414}" type="datetimeFigureOut">
               <a:rPr lang="en-IN" smtClean="0"/>
-              <a:t>24-11-2023</a:t>
+              <a:t>27-05-2024</a:t>
             </a:fld>
             <a:endParaRPr lang="en-IN"/>
           </a:p>
@@ -692,7 +679,7 @@
           <a:p>
             <a:fld id="{AED75D64-2596-4CD3-88B1-63A1A557245C}" type="datetimeFigureOut">
               <a:rPr lang="en-IN" smtClean="0"/>
-              <a:t>24-11-2023</a:t>
+              <a:t>27-05-2024</a:t>
             </a:fld>
             <a:endParaRPr lang="en-IN"/>
           </a:p>
@@ -892,7 +879,7 @@
           <a:p>
             <a:fld id="{AED75D64-2596-4CD3-88B1-63A1A557245C}" type="datetimeFigureOut">
               <a:rPr lang="en-IN" smtClean="0"/>
-              <a:t>24-11-2023</a:t>
+              <a:t>27-05-2024</a:t>
             </a:fld>
             <a:endParaRPr lang="en-IN"/>
           </a:p>
@@ -1102,7 +1089,7 @@
           <a:p>
             <a:fld id="{AED75D64-2596-4CD3-88B1-63A1A557245C}" type="datetimeFigureOut">
               <a:rPr lang="en-IN" smtClean="0"/>
-              <a:t>24-11-2023</a:t>
+              <a:t>27-05-2024</a:t>
             </a:fld>
             <a:endParaRPr lang="en-IN"/>
           </a:p>
@@ -1302,7 +1289,7 @@
           <a:p>
             <a:fld id="{AED75D64-2596-4CD3-88B1-63A1A557245C}" type="datetimeFigureOut">
               <a:rPr lang="en-IN" smtClean="0"/>
-              <a:t>24-11-2023</a:t>
+              <a:t>27-05-2024</a:t>
             </a:fld>
             <a:endParaRPr lang="en-IN"/>
           </a:p>
@@ -1578,7 +1565,7 @@
           <a:p>
             <a:fld id="{AED75D64-2596-4CD3-88B1-63A1A557245C}" type="datetimeFigureOut">
               <a:rPr lang="en-IN" smtClean="0"/>
-              <a:t>24-11-2023</a:t>
+              <a:t>27-05-2024</a:t>
             </a:fld>
             <a:endParaRPr lang="en-IN"/>
           </a:p>
@@ -1846,7 +1833,7 @@
           <a:p>
             <a:fld id="{AED75D64-2596-4CD3-88B1-63A1A557245C}" type="datetimeFigureOut">
               <a:rPr lang="en-IN" smtClean="0"/>
-              <a:t>24-11-2023</a:t>
+              <a:t>27-05-2024</a:t>
             </a:fld>
             <a:endParaRPr lang="en-IN"/>
           </a:p>
@@ -2261,7 +2248,7 @@
           <a:p>
             <a:fld id="{AED75D64-2596-4CD3-88B1-63A1A557245C}" type="datetimeFigureOut">
               <a:rPr lang="en-IN" smtClean="0"/>
-              <a:t>24-11-2023</a:t>
+              <a:t>27-05-2024</a:t>
             </a:fld>
             <a:endParaRPr lang="en-IN"/>
           </a:p>
@@ -2403,7 +2390,7 @@
           <a:p>
             <a:fld id="{AED75D64-2596-4CD3-88B1-63A1A557245C}" type="datetimeFigureOut">
               <a:rPr lang="en-IN" smtClean="0"/>
-              <a:t>24-11-2023</a:t>
+              <a:t>27-05-2024</a:t>
             </a:fld>
             <a:endParaRPr lang="en-IN"/>
           </a:p>
@@ -2516,7 +2503,7 @@
           <a:p>
             <a:fld id="{AED75D64-2596-4CD3-88B1-63A1A557245C}" type="datetimeFigureOut">
               <a:rPr lang="en-IN" smtClean="0"/>
-              <a:t>24-11-2023</a:t>
+              <a:t>27-05-2024</a:t>
             </a:fld>
             <a:endParaRPr lang="en-IN"/>
           </a:p>
@@ -2829,7 +2816,7 @@
           <a:p>
             <a:fld id="{AED75D64-2596-4CD3-88B1-63A1A557245C}" type="datetimeFigureOut">
               <a:rPr lang="en-IN" smtClean="0"/>
-              <a:t>24-11-2023</a:t>
+              <a:t>27-05-2024</a:t>
             </a:fld>
             <a:endParaRPr lang="en-IN"/>
           </a:p>
@@ -3118,7 +3105,7 @@
           <a:p>
             <a:fld id="{AED75D64-2596-4CD3-88B1-63A1A557245C}" type="datetimeFigureOut">
               <a:rPr lang="en-IN" smtClean="0"/>
-              <a:t>24-11-2023</a:t>
+              <a:t>27-05-2024</a:t>
             </a:fld>
             <a:endParaRPr lang="en-IN"/>
           </a:p>
@@ -3361,7 +3348,7 @@
           <a:p>
             <a:fld id="{AED75D64-2596-4CD3-88B1-63A1A557245C}" type="datetimeFigureOut">
               <a:rPr lang="en-IN" smtClean="0"/>
-              <a:t>24-11-2023</a:t>
+              <a:t>27-05-2024</a:t>
             </a:fld>
             <a:endParaRPr lang="en-IN"/>
           </a:p>
@@ -3837,35 +3824,47 @@
         </p:nvSpPr>
         <p:spPr>
           <a:xfrm>
-            <a:off x="4320073" y="4479105"/>
-            <a:ext cx="7554686" cy="1959017"/>
+            <a:off x="4320073" y="3753639"/>
+            <a:ext cx="7554686" cy="2684483"/>
           </a:xfrm>
         </p:spPr>
         <p:txBody>
           <a:bodyPr>
-            <a:normAutofit fontScale="70000" lnSpcReduction="20000"/>
+            <a:normAutofit fontScale="77500" lnSpcReduction="20000"/>
           </a:bodyPr>
           <a:lstStyle/>
           <a:p>
             <a:r>
               <a:rPr lang="en-IN" sz="3800" dirty="0"/>
-              <a:t>                              </a:t>
+              <a:t>                          </a:t>
             </a:r>
             <a:r>
               <a:rPr lang="en-IN" sz="2300" dirty="0"/>
-              <a:t>Guide Name: Mr. Harsh Vardhan </a:t>
+              <a:t>Guide Name: Mr. Vivek Kumar Sharma</a:t>
             </a:r>
           </a:p>
           <a:p>
             <a:r>
               <a:rPr lang="en-IN" sz="2300" dirty="0"/>
-              <a:t>                        Project Members </a:t>
+              <a:t>                                                                         Assistant Professor</a:t>
             </a:r>
           </a:p>
           <a:p>
             <a:r>
               <a:rPr lang="en-IN" sz="2300" dirty="0"/>
-              <a:t>                                                                     1.</a:t>
+              <a:t>                                                                           Department of Computer Science</a:t>
+            </a:r>
+          </a:p>
+          <a:p>
+            <a:r>
+              <a:rPr lang="en-IN" sz="2300" dirty="0"/>
+              <a:t>        Project Members </a:t>
+            </a:r>
+          </a:p>
+          <a:p>
+            <a:r>
+              <a:rPr lang="en-IN" sz="2300" dirty="0"/>
+              <a:t>                                                    1.</a:t>
             </a:r>
             <a:r>
               <a:rPr lang="en-IN" sz="2300" kern="0" dirty="0">
@@ -3892,7 +3891,7 @@
           <a:p>
             <a:r>
               <a:rPr lang="en-IN" sz="2300" dirty="0"/>
-              <a:t>                                                                   2.</a:t>
+              <a:t>                                                  2.</a:t>
             </a:r>
             <a:r>
               <a:rPr lang="en-IN" sz="2300" kern="0" dirty="0">
@@ -3906,7 +3905,7 @@
           <a:p>
             <a:r>
               <a:rPr lang="en-IN" sz="2300" dirty="0"/>
-              <a:t>                                                                    3.</a:t>
+              <a:t>                                                   3.</a:t>
             </a:r>
             <a:r>
               <a:rPr lang="en-IN" sz="2300" kern="0" dirty="0">
@@ -3919,7 +3918,7 @@
           <a:p>
             <a:r>
               <a:rPr lang="en-IN" sz="2300" kern="0" dirty="0"/>
-              <a:t>                                                                 4.</a:t>
+              <a:t>                                                4.</a:t>
             </a:r>
             <a:r>
               <a:rPr lang="en-IN" sz="2300" kern="0" dirty="0">
@@ -4365,7 +4364,7 @@
             </a:br>
             <a:r>
               <a:rPr lang="en-IN" sz="3600" dirty="0"/>
-              <a:t>Project Presentation (KCS 753)</a:t>
+              <a:t>Project Presentation (KCS 851)</a:t>
             </a:r>
           </a:p>
           <a:p>
@@ -4384,6 +4383,42 @@
           </a:p>
         </p:txBody>
       </p:sp>
+      <p:pic>
+        <p:nvPicPr>
+          <p:cNvPr id="5" name="Picture 4">
+            <a:extLst>
+              <a:ext uri="{FF2B5EF4-FFF2-40B4-BE49-F238E27FC236}">
+                <a16:creationId xmlns:a16="http://schemas.microsoft.com/office/drawing/2014/main" id="{399CCFC6-9AB8-E142-8ABF-2BDE178B448E}"/>
+              </a:ext>
+            </a:extLst>
+          </p:cNvPr>
+          <p:cNvPicPr>
+            <a:picLocks noChangeAspect="1"/>
+          </p:cNvPicPr>
+          <p:nvPr/>
+        </p:nvPicPr>
+        <p:blipFill>
+          <a:blip r:embed="rId3">
+            <a:extLst>
+              <a:ext uri="{28A0092B-C50C-407E-A947-70E740481C1C}">
+                <a14:useLocalDpi xmlns:a14="http://schemas.microsoft.com/office/drawing/2010/main" val="0"/>
+              </a:ext>
+            </a:extLst>
+          </a:blip>
+          <a:stretch>
+            <a:fillRect/>
+          </a:stretch>
+        </p:blipFill>
+        <p:spPr>
+          <a:xfrm>
+            <a:off x="329218" y="38875"/>
+            <a:ext cx="11364684" cy="1205982"/>
+          </a:xfrm>
+          <a:prstGeom prst="rect">
+            <a:avLst/>
+          </a:prstGeom>
+        </p:spPr>
+      </p:pic>
     </p:spTree>
     <p:extLst>
       <p:ext uri="{BB962C8B-B14F-4D97-AF65-F5344CB8AC3E}">
@@ -4432,19 +4467,23 @@
         </p:nvSpPr>
         <p:spPr>
           <a:xfrm>
-            <a:off x="838200" y="365125"/>
-            <a:ext cx="10515600" cy="642581"/>
+            <a:off x="838200" y="139959"/>
+            <a:ext cx="10515600" cy="802433"/>
           </a:xfrm>
         </p:spPr>
         <p:txBody>
           <a:bodyPr>
-            <a:normAutofit fontScale="90000"/>
+            <a:normAutofit/>
           </a:bodyPr>
           <a:lstStyle/>
           <a:p>
             <a:r>
+              <a:rPr lang="en-IN" b="1" dirty="0"/>
+              <a:t>Literature Survey-6</a:t>
+            </a:r>
+            <a:r>
               <a:rPr lang="en-IN" dirty="0"/>
-              <a:t>Literature Survey-6	</a:t>
+              <a:t>	</a:t>
             </a:r>
           </a:p>
         </p:txBody>
@@ -4467,8 +4506,8 @@
         </p:nvSpPr>
         <p:spPr>
           <a:xfrm>
-            <a:off x="838200" y="1007706"/>
-            <a:ext cx="10515600" cy="5710335"/>
+            <a:off x="838200" y="1119673"/>
+            <a:ext cx="10515600" cy="5598368"/>
           </a:xfrm>
         </p:spPr>
         <p:txBody>
@@ -4696,19 +4735,23 @@
         </p:nvSpPr>
         <p:spPr>
           <a:xfrm>
-            <a:off x="838200" y="365126"/>
-            <a:ext cx="10515600" cy="623920"/>
+            <a:off x="838200" y="205273"/>
+            <a:ext cx="10515600" cy="998375"/>
           </a:xfrm>
         </p:spPr>
         <p:txBody>
           <a:bodyPr>
-            <a:normAutofit fontScale="90000"/>
+            <a:normAutofit/>
           </a:bodyPr>
           <a:lstStyle/>
           <a:p>
             <a:r>
+              <a:rPr lang="en-IN" b="1" dirty="0"/>
+              <a:t>Literature Survey-7</a:t>
+            </a:r>
+            <a:r>
               <a:rPr lang="en-IN" dirty="0"/>
-              <a:t>Literature Survey-7	</a:t>
+              <a:t>	</a:t>
             </a:r>
           </a:p>
         </p:txBody>
@@ -4731,8 +4774,8 @@
         </p:nvSpPr>
         <p:spPr>
           <a:xfrm>
-            <a:off x="838200" y="989045"/>
-            <a:ext cx="10515600" cy="5579705"/>
+            <a:off x="838200" y="1483567"/>
+            <a:ext cx="10515600" cy="5085183"/>
           </a:xfrm>
         </p:spPr>
         <p:txBody>
@@ -4919,8 +4962,12 @@
           <a:lstStyle/>
           <a:p>
             <a:r>
+              <a:rPr lang="en-IN" sz="4900" b="1" dirty="0"/>
+              <a:t>Literature Survey-8</a:t>
+            </a:r>
+            <a:r>
               <a:rPr lang="en-IN" dirty="0"/>
-              <a:t>Literature Survey-8	</a:t>
+              <a:t>	</a:t>
             </a:r>
           </a:p>
         </p:txBody>
@@ -4943,8 +4990,8 @@
         </p:nvSpPr>
         <p:spPr>
           <a:xfrm>
-            <a:off x="838200" y="1138335"/>
-            <a:ext cx="10515600" cy="5553659"/>
+            <a:off x="838200" y="1287624"/>
+            <a:ext cx="10515600" cy="5404370"/>
           </a:xfrm>
         </p:spPr>
         <p:txBody>
@@ -5119,8 +5166,8 @@
         </p:nvSpPr>
         <p:spPr>
           <a:xfrm>
-            <a:off x="838200" y="75876"/>
-            <a:ext cx="10515600" cy="754548"/>
+            <a:off x="838200" y="75875"/>
+            <a:ext cx="10515600" cy="950491"/>
           </a:xfrm>
         </p:spPr>
         <p:txBody>
@@ -5130,8 +5177,12 @@
           <a:lstStyle/>
           <a:p>
             <a:r>
+              <a:rPr lang="en-IN" b="1" dirty="0"/>
+              <a:t>Literature Survey-9</a:t>
+            </a:r>
+            <a:r>
               <a:rPr lang="en-IN" dirty="0"/>
-              <a:t>Literature Survey-9	</a:t>
+              <a:t>	</a:t>
             </a:r>
           </a:p>
         </p:txBody>
@@ -5154,8 +5205,8 @@
         </p:nvSpPr>
         <p:spPr>
           <a:xfrm>
-            <a:off x="838200" y="830424"/>
-            <a:ext cx="10515600" cy="5786923"/>
+            <a:off x="838200" y="1278294"/>
+            <a:ext cx="10515600" cy="5339053"/>
           </a:xfrm>
         </p:spPr>
         <p:txBody>
@@ -5317,8 +5368,12 @@
           <a:lstStyle/>
           <a:p>
             <a:r>
+              <a:rPr lang="en-IN" sz="4900" b="1" dirty="0"/>
+              <a:t>Literature Survey-10</a:t>
+            </a:r>
+            <a:r>
               <a:rPr lang="en-IN" dirty="0"/>
-              <a:t>Literature Survey-10	</a:t>
+              <a:t>	</a:t>
             </a:r>
           </a:p>
         </p:txBody>
@@ -5341,8 +5396,8 @@
         </p:nvSpPr>
         <p:spPr>
           <a:xfrm>
-            <a:off x="838200" y="1020989"/>
-            <a:ext cx="10515600" cy="5725044"/>
+            <a:off x="838200" y="1175657"/>
+            <a:ext cx="10515600" cy="5570376"/>
           </a:xfrm>
         </p:spPr>
         <p:txBody>
@@ -5611,8 +5666,11 @@
           <a:bodyPr/>
           <a:lstStyle/>
           <a:p>
-            <a:r>
-              <a:rPr lang="en-IN" dirty="0"/>
+            <a:pPr marL="0" indent="0">
+              <a:buNone/>
+            </a:pPr>
+            <a:r>
+              <a:rPr lang="en-IN" sz="4400" dirty="0"/>
               <a:t>DFD level 0-</a:t>
             </a:r>
           </a:p>
@@ -5788,7 +5846,7 @@
           <a:lstStyle/>
           <a:p>
             <a:r>
-              <a:rPr lang="en-IN" sz="3200" dirty="0"/>
+              <a:rPr lang="en-IN" b="1" dirty="0"/>
               <a:t>DFD level-1</a:t>
             </a:r>
           </a:p>
@@ -5859,7 +5917,7 @@
           <p:cNvPr id="2" name="Title 1">
             <a:extLst>
               <a:ext uri="{FF2B5EF4-FFF2-40B4-BE49-F238E27FC236}">
-                <a16:creationId xmlns:a16="http://schemas.microsoft.com/office/drawing/2014/main" id="{FD41FB27-25DA-3D03-63C0-E2B325A08892}"/>
+                <a16:creationId xmlns:a16="http://schemas.microsoft.com/office/drawing/2014/main" id="{3B221B99-1EC7-77DA-30B9-EC5AF20AE4AE}"/>
               </a:ext>
             </a:extLst>
           </p:cNvPr>
@@ -5870,28 +5928,29 @@
             <p:ph type="title"/>
           </p:nvPr>
         </p:nvSpPr>
-        <p:spPr/>
-        <p:txBody>
-          <a:bodyPr/>
-          <a:lstStyle/>
-          <a:p>
-            <a:r>
-              <a:rPr lang="en-US" sz="2800" dirty="0">
-                <a:latin typeface="+mn-lt"/>
-                <a:ea typeface="Times New Roman" panose="02020603050405020304" pitchFamily="18" charset="0"/>
-                <a:cs typeface="Times New Roman" panose="02020603050405020304" pitchFamily="18" charset="0"/>
-              </a:rPr>
+        <p:spPr>
+          <a:xfrm>
+            <a:off x="838200" y="365126"/>
+            <a:ext cx="10515600" cy="1267732"/>
+          </a:xfrm>
+        </p:spPr>
+        <p:txBody>
+          <a:bodyPr>
+            <a:normAutofit fontScale="90000"/>
+          </a:bodyPr>
+          <a:lstStyle/>
+          <a:p>
+            <a:r>
+              <a:rPr lang="en-IN" b="1" dirty="0"/>
               <a:t>DFD level 2</a:t>
             </a:r>
             <a:br>
-              <a:rPr lang="en-IN" sz="1800" dirty="0">
-                <a:effectLst/>
-                <a:latin typeface="Times" panose="02020603050405020304" pitchFamily="18" charset="0"/>
-                <a:ea typeface="Times New Roman" panose="02020603050405020304" pitchFamily="18" charset="0"/>
-                <a:cs typeface="Times New Roman" panose="02020603050405020304" pitchFamily="18" charset="0"/>
-              </a:rPr>
+              <a:rPr lang="en-IN" b="1" dirty="0"/>
             </a:br>
-            <a:endParaRPr lang="en-IN" dirty="0"/>
+            <a:r>
+              <a:rPr lang="en-IN" b="1" dirty="0"/>
+              <a:t>Login</a:t>
+            </a:r>
           </a:p>
         </p:txBody>
       </p:sp>
@@ -5900,7 +5959,7 @@
           <p:cNvPr id="4" name="Picture 3">
             <a:extLst>
               <a:ext uri="{FF2B5EF4-FFF2-40B4-BE49-F238E27FC236}">
-                <a16:creationId xmlns:a16="http://schemas.microsoft.com/office/drawing/2014/main" id="{C76CE624-F998-D8F1-1EC2-A0709335FEBD}"/>
+                <a16:creationId xmlns:a16="http://schemas.microsoft.com/office/drawing/2014/main" id="{AE85F9C4-4678-31E8-CC81-0F303065C83B}"/>
               </a:ext>
             </a:extLst>
           </p:cNvPr>
@@ -5917,8 +5976,8 @@
         </p:blipFill>
         <p:spPr>
           <a:xfrm>
-            <a:off x="967295" y="1569558"/>
-            <a:ext cx="10257409" cy="4588645"/>
+            <a:off x="1521675" y="1782147"/>
+            <a:ext cx="9148650" cy="4029594"/>
           </a:xfrm>
           <a:prstGeom prst="rect">
             <a:avLst/>
@@ -5928,7 +5987,7 @@
     </p:spTree>
     <p:extLst>
       <p:ext uri="{BB962C8B-B14F-4D97-AF65-F5344CB8AC3E}">
-        <p14:creationId xmlns:p14="http://schemas.microsoft.com/office/powerpoint/2010/main" val="2461392298"/>
+        <p14:creationId xmlns:p14="http://schemas.microsoft.com/office/powerpoint/2010/main" val="3531793202"/>
       </p:ext>
     </p:extLst>
   </p:cSld>
@@ -5960,7 +6019,7 @@
           <p:cNvPr id="2" name="Title 1">
             <a:extLst>
               <a:ext uri="{FF2B5EF4-FFF2-40B4-BE49-F238E27FC236}">
-                <a16:creationId xmlns:a16="http://schemas.microsoft.com/office/drawing/2014/main" id="{3B221B99-1EC7-77DA-30B9-EC5AF20AE4AE}"/>
+                <a16:creationId xmlns:a16="http://schemas.microsoft.com/office/drawing/2014/main" id="{FD41FB27-25DA-3D03-63C0-E2B325A08892}"/>
               </a:ext>
             </a:extLst>
           </p:cNvPr>
@@ -5971,19 +6030,49 @@
             <p:ph type="title"/>
           </p:nvPr>
         </p:nvSpPr>
-        <p:spPr/>
-        <p:txBody>
-          <a:bodyPr/>
-          <a:lstStyle/>
-          <a:p>
-            <a:r>
-              <a:rPr lang="en-IN" dirty="0">
-                <a:solidFill>
-                  <a:schemeClr val="bg1"/>
-                </a:solidFill>
+        <p:spPr>
+          <a:xfrm>
+            <a:off x="838200" y="365125"/>
+            <a:ext cx="10515600" cy="1539105"/>
+          </a:xfrm>
+        </p:spPr>
+        <p:txBody>
+          <a:bodyPr>
+            <a:normAutofit fontScale="90000"/>
+          </a:bodyPr>
+          <a:lstStyle/>
+          <a:p>
+            <a:br>
+              <a:rPr lang="en-US" sz="2800" dirty="0">
+                <a:latin typeface="+mn-lt"/>
+                <a:ea typeface="Times New Roman" panose="02020603050405020304" pitchFamily="18" charset="0"/>
+                <a:cs typeface="Times New Roman" panose="02020603050405020304" pitchFamily="18" charset="0"/>
               </a:rPr>
-              <a:t>.</a:t>
-            </a:r>
+            </a:br>
+            <a:br>
+              <a:rPr lang="en-US" sz="2800" dirty="0">
+                <a:latin typeface="Calibri Light" panose="020F0302020204030204" pitchFamily="34" charset="0"/>
+                <a:ea typeface="Calibri Light" panose="020F0302020204030204" pitchFamily="34" charset="0"/>
+                <a:cs typeface="Calibri Light" panose="020F0302020204030204" pitchFamily="34" charset="0"/>
+              </a:rPr>
+            </a:br>
+            <a:r>
+              <a:rPr lang="en-US" b="1" dirty="0">
+                <a:latin typeface="Calibri Light" panose="020F0302020204030204" pitchFamily="34" charset="0"/>
+                <a:ea typeface="Calibri Light" panose="020F0302020204030204" pitchFamily="34" charset="0"/>
+                <a:cs typeface="Calibri Light" panose="020F0302020204030204" pitchFamily="34" charset="0"/>
+              </a:rPr>
+              <a:t>User Account Management</a:t>
+            </a:r>
+            <a:br>
+              <a:rPr lang="en-IN" sz="3200" b="1" dirty="0">
+                <a:effectLst/>
+                <a:latin typeface="Times" panose="02020603050405020304" pitchFamily="18" charset="0"/>
+                <a:ea typeface="Times New Roman" panose="02020603050405020304" pitchFamily="18" charset="0"/>
+                <a:cs typeface="Times New Roman" panose="02020603050405020304" pitchFamily="18" charset="0"/>
+              </a:rPr>
+            </a:br>
+            <a:endParaRPr lang="en-IN" sz="3200" b="1" dirty="0"/>
           </a:p>
         </p:txBody>
       </p:sp>
@@ -5992,7 +6081,7 @@
           <p:cNvPr id="4" name="Picture 3">
             <a:extLst>
               <a:ext uri="{FF2B5EF4-FFF2-40B4-BE49-F238E27FC236}">
-                <a16:creationId xmlns:a16="http://schemas.microsoft.com/office/drawing/2014/main" id="{AE85F9C4-4678-31E8-CC81-0F303065C83B}"/>
+                <a16:creationId xmlns:a16="http://schemas.microsoft.com/office/drawing/2014/main" id="{C76CE624-F998-D8F1-1EC2-A0709335FEBD}"/>
               </a:ext>
             </a:extLst>
           </p:cNvPr>
@@ -6009,8 +6098,8 @@
         </p:blipFill>
         <p:spPr>
           <a:xfrm>
-            <a:off x="1441595" y="858416"/>
-            <a:ext cx="9148650" cy="4528757"/>
+            <a:off x="1200560" y="1904230"/>
+            <a:ext cx="10257409" cy="4588645"/>
           </a:xfrm>
           <a:prstGeom prst="rect">
             <a:avLst/>
@@ -6020,7 +6109,7 @@
     </p:spTree>
     <p:extLst>
       <p:ext uri="{BB962C8B-B14F-4D97-AF65-F5344CB8AC3E}">
-        <p14:creationId xmlns:p14="http://schemas.microsoft.com/office/powerpoint/2010/main" val="3531793202"/>
+        <p14:creationId xmlns:p14="http://schemas.microsoft.com/office/powerpoint/2010/main" val="2461392298"/>
       </p:ext>
     </p:extLst>
   </p:cSld>
@@ -6052,7 +6141,7 @@
           <p:cNvPr id="2" name="Title 1">
             <a:extLst>
               <a:ext uri="{FF2B5EF4-FFF2-40B4-BE49-F238E27FC236}">
-                <a16:creationId xmlns:a16="http://schemas.microsoft.com/office/drawing/2014/main" id="{95F6508B-C084-9DAE-74DF-B95B8A40EF67}"/>
+                <a16:creationId xmlns:a16="http://schemas.microsoft.com/office/drawing/2014/main" id="{8F666984-E93E-D696-F7A5-8E45BF2FC731}"/>
               </a:ext>
             </a:extLst>
           </p:cNvPr>
@@ -6065,37 +6154,24 @@
         </p:nvSpPr>
         <p:spPr/>
         <p:txBody>
-          <a:bodyPr/>
-          <a:lstStyle/>
-          <a:p>
-            <a:r>
-              <a:rPr lang="en-IN" sz="3200" spc="-10" dirty="0">
-                <a:solidFill>
-                  <a:srgbClr val="000000"/>
-                </a:solidFill>
-                <a:effectLst/>
-                <a:latin typeface="+mn-lt"/>
-                <a:ea typeface="Times New Roman" panose="02020603050405020304" pitchFamily="18" charset="0"/>
-              </a:rPr>
-              <a:t>Flow Chart-</a:t>
-            </a:r>
-            <a:br>
-              <a:rPr lang="en-IN" sz="1800" dirty="0">
-                <a:effectLst/>
-                <a:latin typeface="Times New Roman" panose="02020603050405020304" pitchFamily="18" charset="0"/>
-                <a:ea typeface="Times New Roman" panose="02020603050405020304" pitchFamily="18" charset="0"/>
-              </a:rPr>
-            </a:br>
-            <a:endParaRPr lang="en-IN" dirty="0"/>
+          <a:bodyPr>
+            <a:normAutofit/>
+          </a:bodyPr>
+          <a:lstStyle/>
+          <a:p>
+            <a:r>
+              <a:rPr lang="en-IN" b="1" dirty="0"/>
+              <a:t>Chatbot module management</a:t>
+            </a:r>
           </a:p>
         </p:txBody>
       </p:sp>
       <p:pic>
         <p:nvPicPr>
-          <p:cNvPr id="5" name="Picture 4">
-            <a:extLst>
-              <a:ext uri="{FF2B5EF4-FFF2-40B4-BE49-F238E27FC236}">
-                <a16:creationId xmlns:a16="http://schemas.microsoft.com/office/drawing/2014/main" id="{2FEE31D5-67BB-E227-2A2C-83C445DFF8AD}"/>
+          <p:cNvPr id="4" name="Picture 3">
+            <a:extLst>
+              <a:ext uri="{FF2B5EF4-FFF2-40B4-BE49-F238E27FC236}">
+                <a16:creationId xmlns:a16="http://schemas.microsoft.com/office/drawing/2014/main" id="{A59A0D9E-2E87-8B0E-D773-98F19AF0FD2D}"/>
               </a:ext>
             </a:extLst>
           </p:cNvPr>
@@ -6112,8 +6188,8 @@
         </p:blipFill>
         <p:spPr>
           <a:xfrm>
-            <a:off x="1231641" y="979714"/>
-            <a:ext cx="10608906" cy="5680446"/>
+            <a:off x="1428345" y="2022988"/>
+            <a:ext cx="9335309" cy="2812024"/>
           </a:xfrm>
           <a:prstGeom prst="rect">
             <a:avLst/>
@@ -6123,7 +6199,7 @@
     </p:spTree>
     <p:extLst>
       <p:ext uri="{BB962C8B-B14F-4D97-AF65-F5344CB8AC3E}">
-        <p14:creationId xmlns:p14="http://schemas.microsoft.com/office/powerpoint/2010/main" val="2201909142"/>
+        <p14:creationId xmlns:p14="http://schemas.microsoft.com/office/powerpoint/2010/main" val="3061989677"/>
       </p:ext>
     </p:extLst>
   </p:cSld>
@@ -6172,7 +6248,7 @@
           <a:lstStyle/>
           <a:p>
             <a:r>
-              <a:rPr lang="en-IN" dirty="0"/>
+              <a:rPr lang="en-IN" b="1" dirty="0"/>
               <a:t>Problem Statement</a:t>
             </a:r>
           </a:p>
@@ -6194,7 +6270,12 @@
             <p:ph idx="1"/>
           </p:nvPr>
         </p:nvSpPr>
-        <p:spPr/>
+        <p:spPr>
+          <a:xfrm>
+            <a:off x="838200" y="1614196"/>
+            <a:ext cx="10515600" cy="4562767"/>
+          </a:xfrm>
+        </p:spPr>
         <p:txBody>
           <a:bodyPr>
             <a:normAutofit/>
@@ -6249,7 +6330,7 @@
           <p:cNvPr id="2" name="Title 1">
             <a:extLst>
               <a:ext uri="{FF2B5EF4-FFF2-40B4-BE49-F238E27FC236}">
-                <a16:creationId xmlns:a16="http://schemas.microsoft.com/office/drawing/2014/main" id="{3A0AD8C4-46AF-202F-1151-B2A4DC6910AA}"/>
+                <a16:creationId xmlns:a16="http://schemas.microsoft.com/office/drawing/2014/main" id="{3E49118F-6B1D-9E8E-E078-D44831FA7B71}"/>
               </a:ext>
             </a:extLst>
           </p:cNvPr>
@@ -6260,74 +6341,54 @@
             <p:ph type="title"/>
           </p:nvPr>
         </p:nvSpPr>
-        <p:spPr>
-          <a:xfrm>
-            <a:off x="-1324946" y="167853"/>
-            <a:ext cx="7931020" cy="1726261"/>
-          </a:xfrm>
-        </p:spPr>
-        <p:txBody>
-          <a:bodyPr/>
-          <a:lstStyle/>
-          <a:p>
-            <a:pPr algn="ctr"/>
-            <a:r>
-              <a:rPr lang="en-IN" dirty="0"/>
-              <a:t>PROJECT OUTPUT</a:t>
-            </a:r>
-            <a:br>
-              <a:rPr lang="en-IN" dirty="0"/>
-            </a:br>
-            <a:r>
-              <a:rPr lang="en-IN" dirty="0"/>
-              <a:t>       </a:t>
-            </a:r>
-            <a:r>
-              <a:rPr lang="en-IN" sz="3200" dirty="0"/>
-              <a:t>Sign Up/Login Page</a:t>
+        <p:spPr/>
+        <p:txBody>
+          <a:bodyPr>
+            <a:normAutofit/>
+          </a:bodyPr>
+          <a:lstStyle/>
+          <a:p>
+            <a:r>
+              <a:rPr lang="en-IN" b="1" dirty="0"/>
+              <a:t>Videos module</a:t>
             </a:r>
           </a:p>
         </p:txBody>
       </p:sp>
       <p:pic>
         <p:nvPicPr>
-          <p:cNvPr id="7" name="Content Placeholder 6">
-            <a:extLst>
-              <a:ext uri="{FF2B5EF4-FFF2-40B4-BE49-F238E27FC236}">
-                <a16:creationId xmlns:a16="http://schemas.microsoft.com/office/drawing/2014/main" id="{1ABDB367-8F5A-A328-F336-9780B0615D6D}"/>
+          <p:cNvPr id="4" name="Picture 3">
+            <a:extLst>
+              <a:ext uri="{FF2B5EF4-FFF2-40B4-BE49-F238E27FC236}">
+                <a16:creationId xmlns:a16="http://schemas.microsoft.com/office/drawing/2014/main" id="{7C90C0D0-019E-C5DE-7FAA-8213EA5244DB}"/>
               </a:ext>
             </a:extLst>
           </p:cNvPr>
           <p:cNvPicPr>
-            <a:picLocks noGrp="1" noChangeAspect="1"/>
+            <a:picLocks noChangeAspect="1"/>
           </p:cNvPicPr>
-          <p:nvPr>
-            <p:ph idx="1"/>
-          </p:nvPr>
+          <p:nvPr/>
         </p:nvPicPr>
         <p:blipFill>
-          <a:blip r:embed="rId2">
-            <a:extLst>
-              <a:ext uri="{28A0092B-C50C-407E-A947-70E740481C1C}">
-                <a14:useLocalDpi xmlns:a14="http://schemas.microsoft.com/office/drawing/2010/main" val="0"/>
-              </a:ext>
-            </a:extLst>
-          </a:blip>
+          <a:blip r:embed="rId2"/>
           <a:stretch>
             <a:fillRect/>
           </a:stretch>
         </p:blipFill>
         <p:spPr>
           <a:xfrm>
-            <a:off x="1599161" y="1894114"/>
-            <a:ext cx="9161628" cy="4351338"/>
+            <a:off x="1683154" y="2017952"/>
+            <a:ext cx="9236240" cy="2392887"/>
           </a:xfrm>
+          <a:prstGeom prst="rect">
+            <a:avLst/>
+          </a:prstGeom>
         </p:spPr>
       </p:pic>
     </p:spTree>
     <p:extLst>
       <p:ext uri="{BB962C8B-B14F-4D97-AF65-F5344CB8AC3E}">
-        <p14:creationId xmlns:p14="http://schemas.microsoft.com/office/powerpoint/2010/main" val="540768107"/>
+        <p14:creationId xmlns:p14="http://schemas.microsoft.com/office/powerpoint/2010/main" val="2050494326"/>
       </p:ext>
     </p:extLst>
   </p:cSld>
@@ -6359,7 +6420,7 @@
           <p:cNvPr id="2" name="Title 1">
             <a:extLst>
               <a:ext uri="{FF2B5EF4-FFF2-40B4-BE49-F238E27FC236}">
-                <a16:creationId xmlns:a16="http://schemas.microsoft.com/office/drawing/2014/main" id="{3A0AD8C4-46AF-202F-1151-B2A4DC6910AA}"/>
+                <a16:creationId xmlns:a16="http://schemas.microsoft.com/office/drawing/2014/main" id="{B0274881-2DA0-3011-D603-3D36F748C67E}"/>
               </a:ext>
             </a:extLst>
           </p:cNvPr>
@@ -6372,51 +6433,24 @@
         </p:nvSpPr>
         <p:spPr/>
         <p:txBody>
-          <a:bodyPr/>
-          <a:lstStyle/>
-          <a:p>
-            <a:r>
-              <a:rPr lang="en-IN" dirty="0">
-                <a:solidFill>
-                  <a:schemeClr val="bg1"/>
-                </a:solidFill>
-              </a:rPr>
-              <a:t>.</a:t>
-            </a:r>
-          </a:p>
-        </p:txBody>
-      </p:sp>
-      <p:sp>
-        <p:nvSpPr>
-          <p:cNvPr id="4" name="Content Placeholder 3">
-            <a:extLst>
-              <a:ext uri="{FF2B5EF4-FFF2-40B4-BE49-F238E27FC236}">
-                <a16:creationId xmlns:a16="http://schemas.microsoft.com/office/drawing/2014/main" id="{E262B5DA-215F-3945-FAA0-34C20E440061}"/>
-              </a:ext>
-            </a:extLst>
-          </p:cNvPr>
-          <p:cNvSpPr>
-            <a:spLocks noGrp="1"/>
-          </p:cNvSpPr>
-          <p:nvPr>
-            <p:ph idx="1"/>
-          </p:nvPr>
-        </p:nvSpPr>
-        <p:spPr/>
-        <p:txBody>
-          <a:bodyPr/>
-          <a:lstStyle/>
-          <a:p>
-            <a:endParaRPr lang="en-IN"/>
+          <a:bodyPr>
+            <a:normAutofit/>
+          </a:bodyPr>
+          <a:lstStyle/>
+          <a:p>
+            <a:r>
+              <a:rPr lang="en-IN" b="1" dirty="0"/>
+              <a:t>Prediction module process</a:t>
+            </a:r>
           </a:p>
         </p:txBody>
       </p:sp>
       <p:pic>
         <p:nvPicPr>
-          <p:cNvPr id="3" name="Content Placeholder 4">
-            <a:extLst>
-              <a:ext uri="{FF2B5EF4-FFF2-40B4-BE49-F238E27FC236}">
-                <a16:creationId xmlns:a16="http://schemas.microsoft.com/office/drawing/2014/main" id="{8DC6F955-CF91-CCBC-E572-17631EC43BB2}"/>
+          <p:cNvPr id="4" name="Picture 3">
+            <a:extLst>
+              <a:ext uri="{FF2B5EF4-FFF2-40B4-BE49-F238E27FC236}">
+                <a16:creationId xmlns:a16="http://schemas.microsoft.com/office/drawing/2014/main" id="{6F6882CF-9428-E0A4-65FE-E58AE526D164}"/>
               </a:ext>
             </a:extLst>
           </p:cNvPr>
@@ -6426,187 +6460,25 @@
           <p:nvPr/>
         </p:nvPicPr>
         <p:blipFill>
-          <a:blip r:embed="rId2">
-            <a:extLst>
-              <a:ext uri="{28A0092B-C50C-407E-A947-70E740481C1C}">
-                <a14:useLocalDpi xmlns:a14="http://schemas.microsoft.com/office/drawing/2010/main" val="0"/>
-              </a:ext>
-            </a:extLst>
-          </a:blip>
+          <a:blip r:embed="rId2"/>
           <a:stretch>
             <a:fillRect/>
           </a:stretch>
         </p:blipFill>
         <p:spPr>
           <a:xfrm>
-            <a:off x="737118" y="270588"/>
-            <a:ext cx="10616681" cy="6382139"/>
+            <a:off x="1496931" y="1856792"/>
+            <a:ext cx="9198137" cy="3116424"/>
           </a:xfrm>
           <a:prstGeom prst="rect">
             <a:avLst/>
           </a:prstGeom>
         </p:spPr>
       </p:pic>
-      <p:sp>
-        <p:nvSpPr>
-          <p:cNvPr id="6" name="Rectangle 5">
-            <a:extLst>
-              <a:ext uri="{FF2B5EF4-FFF2-40B4-BE49-F238E27FC236}">
-                <a16:creationId xmlns:a16="http://schemas.microsoft.com/office/drawing/2014/main" id="{2B143617-5D6F-BB65-7343-FA7F41AEBCC8}"/>
-              </a:ext>
-            </a:extLst>
-          </p:cNvPr>
-          <p:cNvSpPr/>
-          <p:nvPr/>
-        </p:nvSpPr>
-        <p:spPr>
-          <a:xfrm>
-            <a:off x="6096000" y="6176963"/>
-            <a:ext cx="1461796" cy="315912"/>
-          </a:xfrm>
-          <a:prstGeom prst="rect">
-            <a:avLst/>
-          </a:prstGeom>
-          <a:solidFill>
-            <a:schemeClr val="bg1"/>
-          </a:solidFill>
-          <a:ln>
-            <a:solidFill>
-              <a:schemeClr val="bg1"/>
-            </a:solidFill>
-          </a:ln>
-        </p:spPr>
-        <p:style>
-          <a:lnRef idx="2">
-            <a:schemeClr val="accent1">
-              <a:shade val="15000"/>
-            </a:schemeClr>
-          </a:lnRef>
-          <a:fillRef idx="1">
-            <a:schemeClr val="accent1"/>
-          </a:fillRef>
-          <a:effectRef idx="0">
-            <a:schemeClr val="accent1"/>
-          </a:effectRef>
-          <a:fontRef idx="minor">
-            <a:schemeClr val="lt1"/>
-          </a:fontRef>
-        </p:style>
-        <p:txBody>
-          <a:bodyPr rtlCol="0" anchor="ctr"/>
-          <a:lstStyle/>
-          <a:p>
-            <a:pPr algn="ctr"/>
-            <a:endParaRPr lang="en-IN"/>
-          </a:p>
-        </p:txBody>
-      </p:sp>
-      <mc:AlternateContent xmlns:mc="http://schemas.openxmlformats.org/markup-compatibility/2006" xmlns:p14="http://schemas.microsoft.com/office/powerpoint/2010/main">
-        <mc:Choice Requires="p14">
-          <p:contentPart p14:bwMode="auto" r:id="rId3">
-            <p14:nvContentPartPr>
-              <p14:cNvPr id="7" name="Ink 6">
-                <a:extLst>
-                  <a:ext uri="{FF2B5EF4-FFF2-40B4-BE49-F238E27FC236}">
-                    <a16:creationId xmlns:a16="http://schemas.microsoft.com/office/drawing/2014/main" id="{63C82AAF-B0E2-15C3-E90B-284BC85DE0EB}"/>
-                  </a:ext>
-                </a:extLst>
-              </p14:cNvPr>
-              <p14:cNvContentPartPr/>
-              <p14:nvPr/>
-            </p14:nvContentPartPr>
-            <p14:xfrm>
-              <a:off x="13165288" y="3303081"/>
-              <a:ext cx="360" cy="360"/>
-            </p14:xfrm>
-          </p:contentPart>
-        </mc:Choice>
-        <mc:Fallback xmlns="">
-          <p:pic>
-            <p:nvPicPr>
-              <p:cNvPr id="7" name="Ink 6">
-                <a:extLst>
-                  <a:ext uri="{FF2B5EF4-FFF2-40B4-BE49-F238E27FC236}">
-                    <a16:creationId xmlns:a16="http://schemas.microsoft.com/office/drawing/2014/main" id="{63C82AAF-B0E2-15C3-E90B-284BC85DE0EB}"/>
-                  </a:ext>
-                </a:extLst>
-              </p:cNvPr>
-              <p:cNvPicPr/>
-              <p:nvPr/>
-            </p:nvPicPr>
-            <p:blipFill>
-              <a:blip r:embed="rId4"/>
-              <a:stretch>
-                <a:fillRect/>
-              </a:stretch>
-            </p:blipFill>
-            <p:spPr>
-              <a:xfrm>
-                <a:off x="13156648" y="3294081"/>
-                <a:ext cx="18000" cy="18000"/>
-              </a:xfrm>
-              <a:prstGeom prst="rect">
-                <a:avLst/>
-              </a:prstGeom>
-            </p:spPr>
-          </p:pic>
-        </mc:Fallback>
-      </mc:AlternateContent>
-      <mc:AlternateContent xmlns:mc="http://schemas.openxmlformats.org/markup-compatibility/2006" xmlns:p14="http://schemas.microsoft.com/office/powerpoint/2010/main">
-        <mc:Choice Requires="p14">
-          <p:contentPart p14:bwMode="auto" r:id="rId5">
-            <p14:nvContentPartPr>
-              <p14:cNvPr id="8" name="Ink 7">
-                <a:extLst>
-                  <a:ext uri="{FF2B5EF4-FFF2-40B4-BE49-F238E27FC236}">
-                    <a16:creationId xmlns:a16="http://schemas.microsoft.com/office/drawing/2014/main" id="{252FCBC1-DE10-D5B7-36C9-546F16896E63}"/>
-                  </a:ext>
-                </a:extLst>
-              </p14:cNvPr>
-              <p14:cNvContentPartPr/>
-              <p14:nvPr/>
-            </p14:nvContentPartPr>
-            <p14:xfrm>
-              <a:off x="1511368" y="326241"/>
-              <a:ext cx="360" cy="360"/>
-            </p14:xfrm>
-          </p:contentPart>
-        </mc:Choice>
-        <mc:Fallback xmlns="">
-          <p:pic>
-            <p:nvPicPr>
-              <p:cNvPr id="8" name="Ink 7">
-                <a:extLst>
-                  <a:ext uri="{FF2B5EF4-FFF2-40B4-BE49-F238E27FC236}">
-                    <a16:creationId xmlns:a16="http://schemas.microsoft.com/office/drawing/2014/main" id="{252FCBC1-DE10-D5B7-36C9-546F16896E63}"/>
-                  </a:ext>
-                </a:extLst>
-              </p:cNvPr>
-              <p:cNvPicPr/>
-              <p:nvPr/>
-            </p:nvPicPr>
-            <p:blipFill>
-              <a:blip r:embed="rId4"/>
-              <a:stretch>
-                <a:fillRect/>
-              </a:stretch>
-            </p:blipFill>
-            <p:spPr>
-              <a:xfrm>
-                <a:off x="1502728" y="317601"/>
-                <a:ext cx="18000" cy="18000"/>
-              </a:xfrm>
-              <a:prstGeom prst="rect">
-                <a:avLst/>
-              </a:prstGeom>
-            </p:spPr>
-          </p:pic>
-        </mc:Fallback>
-      </mc:AlternateContent>
     </p:spTree>
     <p:extLst>
       <p:ext uri="{BB962C8B-B14F-4D97-AF65-F5344CB8AC3E}">
-        <p14:creationId xmlns:p14="http://schemas.microsoft.com/office/powerpoint/2010/main" val="461137617"/>
+        <p14:creationId xmlns:p14="http://schemas.microsoft.com/office/powerpoint/2010/main" val="1874683635"/>
       </p:ext>
     </p:extLst>
   </p:cSld>
@@ -6638,7 +6510,7 @@
           <p:cNvPr id="2" name="Title 1">
             <a:extLst>
               <a:ext uri="{FF2B5EF4-FFF2-40B4-BE49-F238E27FC236}">
-                <a16:creationId xmlns:a16="http://schemas.microsoft.com/office/drawing/2014/main" id="{3A0AD8C4-46AF-202F-1151-B2A4DC6910AA}"/>
+                <a16:creationId xmlns:a16="http://schemas.microsoft.com/office/drawing/2014/main" id="{73AEA24A-AD45-59C2-DFF8-A067040EA7BD}"/>
               </a:ext>
             </a:extLst>
           </p:cNvPr>
@@ -6655,48 +6527,27 @@
           <a:lstStyle/>
           <a:p>
             <a:r>
-              <a:rPr lang="en-IN" dirty="0"/>
-              <a:t>Project Status</a:t>
-            </a:r>
-          </a:p>
-        </p:txBody>
-      </p:sp>
-      <p:sp>
-        <p:nvSpPr>
-          <p:cNvPr id="4" name="Content Placeholder 3">
-            <a:extLst>
-              <a:ext uri="{FF2B5EF4-FFF2-40B4-BE49-F238E27FC236}">
-                <a16:creationId xmlns:a16="http://schemas.microsoft.com/office/drawing/2014/main" id="{E262B5DA-215F-3945-FAA0-34C20E440061}"/>
-              </a:ext>
-            </a:extLst>
-          </p:cNvPr>
-          <p:cNvSpPr>
-            <a:spLocks noGrp="1"/>
-          </p:cNvSpPr>
-          <p:nvPr>
-            <p:ph idx="1"/>
-          </p:nvPr>
-        </p:nvSpPr>
-        <p:spPr/>
-        <p:txBody>
-          <a:bodyPr/>
-          <a:lstStyle/>
-          <a:p>
-            <a:endParaRPr lang="en-IN"/>
+              <a:rPr lang="en-US" b="1" dirty="0"/>
+              <a:t>Use Case Diagram</a:t>
+            </a:r>
+            <a:br>
+              <a:rPr lang="en-US" dirty="0"/>
+            </a:br>
+            <a:endParaRPr lang="en-IN" dirty="0"/>
           </a:p>
         </p:txBody>
       </p:sp>
       <p:pic>
         <p:nvPicPr>
-          <p:cNvPr id="5" name="Picture 4">
-            <a:extLst>
-              <a:ext uri="{FF2B5EF4-FFF2-40B4-BE49-F238E27FC236}">
-                <a16:creationId xmlns:a16="http://schemas.microsoft.com/office/drawing/2014/main" id="{AA3EBCF7-AD35-455E-17EA-7F0C00C42B50}"/>
+          <p:cNvPr id="1026" name="Picture 1">
+            <a:extLst>
+              <a:ext uri="{FF2B5EF4-FFF2-40B4-BE49-F238E27FC236}">
+                <a16:creationId xmlns:a16="http://schemas.microsoft.com/office/drawing/2014/main" id="{764B69E3-7D13-976B-015C-662071C3A1F2}"/>
               </a:ext>
             </a:extLst>
           </p:cNvPr>
           <p:cNvPicPr>
-            <a:picLocks noChangeAspect="1"/>
+            <a:picLocks noChangeAspect="1" noChangeArrowheads="1"/>
           </p:cNvPicPr>
           <p:nvPr/>
         </p:nvPicPr>
@@ -6708,24 +6559,48 @@
               </a:ext>
             </a:extLst>
           </a:blip>
+          <a:srcRect/>
           <a:stretch>
             <a:fillRect/>
           </a:stretch>
         </p:blipFill>
-        <p:spPr>
+        <p:spPr bwMode="auto">
           <a:xfrm>
-            <a:off x="587828" y="453390"/>
-            <a:ext cx="10431624" cy="5951220"/>
+            <a:off x="1175657" y="1212980"/>
+            <a:ext cx="9442580" cy="5279895"/>
           </a:xfrm>
           <a:prstGeom prst="rect">
             <a:avLst/>
           </a:prstGeom>
+          <a:noFill/>
+          <a:ln>
+            <a:noFill/>
+          </a:ln>
+          <a:extLst>
+            <a:ext uri="{909E8E84-426E-40DD-AFC4-6F175D3DCCD1}">
+              <a14:hiddenFill xmlns:a14="http://schemas.microsoft.com/office/drawing/2010/main">
+                <a:solidFill>
+                  <a:srgbClr val="FFFFFF"/>
+                </a:solidFill>
+              </a14:hiddenFill>
+            </a:ext>
+            <a:ext uri="{91240B29-F687-4F45-9708-019B960494DF}">
+              <a14:hiddenLine xmlns:a14="http://schemas.microsoft.com/office/drawing/2010/main" w="9525">
+                <a:solidFill>
+                  <a:srgbClr val="000000"/>
+                </a:solidFill>
+                <a:miter lim="800000"/>
+                <a:headEnd/>
+                <a:tailEnd/>
+              </a14:hiddenLine>
+            </a:ext>
+          </a:extLst>
         </p:spPr>
       </p:pic>
     </p:spTree>
     <p:extLst>
       <p:ext uri="{BB962C8B-B14F-4D97-AF65-F5344CB8AC3E}">
-        <p14:creationId xmlns:p14="http://schemas.microsoft.com/office/powerpoint/2010/main" val="3757391700"/>
+        <p14:creationId xmlns:p14="http://schemas.microsoft.com/office/powerpoint/2010/main" val="1919528054"/>
       </p:ext>
     </p:extLst>
   </p:cSld>
@@ -6757,7 +6632,7 @@
           <p:cNvPr id="2" name="Title 1">
             <a:extLst>
               <a:ext uri="{FF2B5EF4-FFF2-40B4-BE49-F238E27FC236}">
-                <a16:creationId xmlns:a16="http://schemas.microsoft.com/office/drawing/2014/main" id="{3A0AD8C4-46AF-202F-1151-B2A4DC6910AA}"/>
+                <a16:creationId xmlns:a16="http://schemas.microsoft.com/office/drawing/2014/main" id="{DDEC9F0A-4FD6-919F-496D-83789811DC96}"/>
               </a:ext>
             </a:extLst>
           </p:cNvPr>
@@ -6773,47 +6648,78 @@
           <a:bodyPr/>
           <a:lstStyle/>
           <a:p>
-            <a:pPr algn="ctr"/>
-            <a:r>
-              <a:rPr lang="en-IN" dirty="0"/>
-              <a:t>Heart Disease Predictor</a:t>
-            </a:r>
+            <a:r>
+              <a:rPr lang="en-US" b="1" dirty="0"/>
+              <a:t>ER Diagram</a:t>
+            </a:r>
+            <a:endParaRPr lang="en-IN" b="1" dirty="0"/>
           </a:p>
         </p:txBody>
       </p:sp>
       <p:pic>
         <p:nvPicPr>
-          <p:cNvPr id="5" name="Content Placeholder 4">
-            <a:extLst>
-              <a:ext uri="{FF2B5EF4-FFF2-40B4-BE49-F238E27FC236}">
-                <a16:creationId xmlns:a16="http://schemas.microsoft.com/office/drawing/2014/main" id="{78E745DE-CC65-58A9-3B15-C2B4AC67913C}"/>
+          <p:cNvPr id="1027" name="Picture 1">
+            <a:extLst>
+              <a:ext uri="{FF2B5EF4-FFF2-40B4-BE49-F238E27FC236}">
+                <a16:creationId xmlns:a16="http://schemas.microsoft.com/office/drawing/2014/main" id="{ADC3710E-1348-EC1C-39F6-57A0B1A62CA3}"/>
               </a:ext>
             </a:extLst>
           </p:cNvPr>
           <p:cNvPicPr>
-            <a:picLocks noGrp="1" noChangeAspect="1"/>
+            <a:picLocks noChangeAspect="1" noChangeArrowheads="1"/>
           </p:cNvPicPr>
-          <p:nvPr>
-            <p:ph idx="1"/>
-          </p:nvPr>
+          <p:nvPr/>
         </p:nvPicPr>
         <p:blipFill>
-          <a:blip r:embed="rId2"/>
+          <a:blip r:embed="rId2">
+            <a:extLst>
+              <a:ext uri="{28A0092B-C50C-407E-A947-70E740481C1C}">
+                <a14:useLocalDpi xmlns:a14="http://schemas.microsoft.com/office/drawing/2010/main" val="0"/>
+              </a:ext>
+            </a:extLst>
+          </a:blip>
+          <a:srcRect/>
           <a:stretch>
             <a:fillRect/>
           </a:stretch>
         </p:blipFill>
-        <p:spPr>
+        <p:spPr bwMode="auto">
           <a:xfrm>
-            <a:off x="838200" y="1398361"/>
-            <a:ext cx="10515599" cy="5094514"/>
+            <a:off x="1045029" y="1390262"/>
+            <a:ext cx="10515600" cy="5275360"/>
           </a:xfrm>
+          <a:prstGeom prst="rect">
+            <a:avLst/>
+          </a:prstGeom>
+          <a:noFill/>
+          <a:ln>
+            <a:noFill/>
+          </a:ln>
+          <a:extLst>
+            <a:ext uri="{909E8E84-426E-40DD-AFC4-6F175D3DCCD1}">
+              <a14:hiddenFill xmlns:a14="http://schemas.microsoft.com/office/drawing/2010/main">
+                <a:solidFill>
+                  <a:srgbClr val="FFFFFF"/>
+                </a:solidFill>
+              </a14:hiddenFill>
+            </a:ext>
+            <a:ext uri="{91240B29-F687-4F45-9708-019B960494DF}">
+              <a14:hiddenLine xmlns:a14="http://schemas.microsoft.com/office/drawing/2010/main" w="9525">
+                <a:solidFill>
+                  <a:srgbClr val="000000"/>
+                </a:solidFill>
+                <a:miter lim="800000"/>
+                <a:headEnd/>
+                <a:tailEnd/>
+              </a14:hiddenLine>
+            </a:ext>
+          </a:extLst>
         </p:spPr>
       </p:pic>
     </p:spTree>
     <p:extLst>
       <p:ext uri="{BB962C8B-B14F-4D97-AF65-F5344CB8AC3E}">
-        <p14:creationId xmlns:p14="http://schemas.microsoft.com/office/powerpoint/2010/main" val="2517451286"/>
+        <p14:creationId xmlns:p14="http://schemas.microsoft.com/office/powerpoint/2010/main" val="2326378537"/>
       </p:ext>
     </p:extLst>
   </p:cSld>
@@ -6845,7 +6751,7 @@
           <p:cNvPr id="2" name="Title 1">
             <a:extLst>
               <a:ext uri="{FF2B5EF4-FFF2-40B4-BE49-F238E27FC236}">
-                <a16:creationId xmlns:a16="http://schemas.microsoft.com/office/drawing/2014/main" id="{3A0AD8C4-46AF-202F-1151-B2A4DC6910AA}"/>
+                <a16:creationId xmlns:a16="http://schemas.microsoft.com/office/drawing/2014/main" id="{95F6508B-C084-9DAE-74DF-B95B8A40EF67}"/>
               </a:ext>
             </a:extLst>
           </p:cNvPr>
@@ -6861,16 +6767,33 @@
           <a:bodyPr/>
           <a:lstStyle/>
           <a:p>
+            <a:r>
+              <a:rPr lang="en-IN" b="1" spc="-10" dirty="0">
+                <a:solidFill>
+                  <a:srgbClr val="000000"/>
+                </a:solidFill>
+                <a:effectLst/>
+                <a:ea typeface="Times New Roman" panose="02020603050405020304" pitchFamily="18" charset="0"/>
+              </a:rPr>
+              <a:t>Flow Chart-</a:t>
+            </a:r>
+            <a:br>
+              <a:rPr lang="en-IN" sz="1800" dirty="0">
+                <a:effectLst/>
+                <a:latin typeface="Times New Roman" panose="02020603050405020304" pitchFamily="18" charset="0"/>
+                <a:ea typeface="Times New Roman" panose="02020603050405020304" pitchFamily="18" charset="0"/>
+              </a:rPr>
+            </a:br>
             <a:endParaRPr lang="en-IN" dirty="0"/>
           </a:p>
         </p:txBody>
       </p:sp>
       <p:pic>
         <p:nvPicPr>
-          <p:cNvPr id="7" name="Picture 6">
-            <a:extLst>
-              <a:ext uri="{FF2B5EF4-FFF2-40B4-BE49-F238E27FC236}">
-                <a16:creationId xmlns:a16="http://schemas.microsoft.com/office/drawing/2014/main" id="{41B46C9D-160E-A290-D9AF-FD6E1E86F157}"/>
+          <p:cNvPr id="5" name="Picture 4">
+            <a:extLst>
+              <a:ext uri="{FF2B5EF4-FFF2-40B4-BE49-F238E27FC236}">
+                <a16:creationId xmlns:a16="http://schemas.microsoft.com/office/drawing/2014/main" id="{2FEE31D5-67BB-E227-2A2C-83C445DFF8AD}"/>
               </a:ext>
             </a:extLst>
           </p:cNvPr>
@@ -6887,58 +6810,18 @@
         </p:blipFill>
         <p:spPr>
           <a:xfrm>
-            <a:off x="390330" y="177280"/>
-            <a:ext cx="11187893" cy="6143705"/>
+            <a:off x="1073020" y="1035698"/>
+            <a:ext cx="10767527" cy="5624461"/>
           </a:xfrm>
           <a:prstGeom prst="rect">
             <a:avLst/>
           </a:prstGeom>
         </p:spPr>
       </p:pic>
-      <p:sp>
-        <p:nvSpPr>
-          <p:cNvPr id="8" name="Content Placeholder 7">
-            <a:extLst>
-              <a:ext uri="{FF2B5EF4-FFF2-40B4-BE49-F238E27FC236}">
-                <a16:creationId xmlns:a16="http://schemas.microsoft.com/office/drawing/2014/main" id="{174DCC44-AB2F-6ECE-0386-73A2A7CA186B}"/>
-              </a:ext>
-            </a:extLst>
-          </p:cNvPr>
-          <p:cNvSpPr>
-            <a:spLocks noGrp="1"/>
-          </p:cNvSpPr>
-          <p:nvPr>
-            <p:ph idx="1"/>
-          </p:nvPr>
-        </p:nvSpPr>
-        <p:spPr>
-          <a:xfrm>
-            <a:off x="838200" y="1872278"/>
-            <a:ext cx="10515600" cy="4351338"/>
-          </a:xfrm>
-        </p:spPr>
-        <p:txBody>
-          <a:bodyPr/>
-          <a:lstStyle/>
-          <a:p>
-            <a:pPr marL="0" indent="0">
-              <a:buNone/>
-            </a:pPr>
-            <a:r>
-              <a:rPr lang="en-IN" dirty="0">
-                <a:solidFill>
-                  <a:schemeClr val="bg1"/>
-                </a:solidFill>
-              </a:rPr>
-              <a:t>.</a:t>
-            </a:r>
-          </a:p>
-        </p:txBody>
-      </p:sp>
     </p:spTree>
     <p:extLst>
       <p:ext uri="{BB962C8B-B14F-4D97-AF65-F5344CB8AC3E}">
-        <p14:creationId xmlns:p14="http://schemas.microsoft.com/office/powerpoint/2010/main" val="3716601818"/>
+        <p14:creationId xmlns:p14="http://schemas.microsoft.com/office/powerpoint/2010/main" val="2201909142"/>
       </p:ext>
     </p:extLst>
   </p:cSld>
@@ -6970,6 +6853,548 @@
           <p:cNvPr id="2" name="Title 1">
             <a:extLst>
               <a:ext uri="{FF2B5EF4-FFF2-40B4-BE49-F238E27FC236}">
+                <a16:creationId xmlns:a16="http://schemas.microsoft.com/office/drawing/2014/main" id="{44865C00-5B99-2D93-0900-0471A0907E41}"/>
+              </a:ext>
+            </a:extLst>
+          </p:cNvPr>
+          <p:cNvSpPr>
+            <a:spLocks noGrp="1"/>
+          </p:cNvSpPr>
+          <p:nvPr>
+            <p:ph type="title"/>
+          </p:nvPr>
+        </p:nvSpPr>
+        <p:spPr>
+          <a:xfrm>
+            <a:off x="838200" y="365125"/>
+            <a:ext cx="10515600" cy="2732638"/>
+          </a:xfrm>
+        </p:spPr>
+        <p:txBody>
+          <a:bodyPr>
+            <a:normAutofit fontScale="90000"/>
+          </a:bodyPr>
+          <a:lstStyle/>
+          <a:p>
+            <a:r>
+              <a:rPr lang="en-IN" b="1" dirty="0"/>
+              <a:t>Patent Status</a:t>
+            </a:r>
+            <a:br>
+              <a:rPr lang="en-IN" b="1" dirty="0"/>
+            </a:br>
+            <a:br>
+              <a:rPr lang="en-IN" b="1" dirty="0"/>
+            </a:br>
+            <a:r>
+              <a:rPr lang="en-IN" sz="2800" dirty="0"/>
+              <a:t>Draft Link-</a:t>
+            </a:r>
+            <a:r>
+              <a:rPr lang="en-IN" sz="2700" dirty="0">
+                <a:hlinkClick r:id="rId2"/>
+              </a:rPr>
+              <a:t>https://docs.google.com/document/d/1Bq4ALa5BL0EUM_FQjdtcWNRkiTPdY9Lf/</a:t>
+            </a:r>
+            <a:r>
+              <a:rPr lang="en-IN" sz="2700" dirty="0" err="1">
+                <a:hlinkClick r:id="rId2"/>
+              </a:rPr>
+              <a:t>edit?usp</a:t>
+            </a:r>
+            <a:r>
+              <a:rPr lang="en-IN" sz="2700" dirty="0">
+                <a:hlinkClick r:id="rId2"/>
+              </a:rPr>
+              <a:t>=</a:t>
+            </a:r>
+            <a:r>
+              <a:rPr lang="en-IN" sz="2700" dirty="0" err="1">
+                <a:hlinkClick r:id="rId2"/>
+              </a:rPr>
+              <a:t>sharing&amp;ouid</a:t>
+            </a:r>
+            <a:r>
+              <a:rPr lang="en-IN" sz="2700" dirty="0">
+                <a:hlinkClick r:id="rId2"/>
+              </a:rPr>
+              <a:t>=108444590373988136484&amp;rtpof=</a:t>
+            </a:r>
+            <a:r>
+              <a:rPr lang="en-IN" sz="2700" dirty="0" err="1">
+                <a:hlinkClick r:id="rId2"/>
+              </a:rPr>
+              <a:t>true&amp;sd</a:t>
+            </a:r>
+            <a:r>
+              <a:rPr lang="en-IN" sz="2700" dirty="0">
+                <a:hlinkClick r:id="rId2"/>
+              </a:rPr>
+              <a:t>=true</a:t>
+            </a:r>
+            <a:endParaRPr lang="en-IN" sz="2700" dirty="0"/>
+          </a:p>
+        </p:txBody>
+      </p:sp>
+    </p:spTree>
+    <p:extLst>
+      <p:ext uri="{BB962C8B-B14F-4D97-AF65-F5344CB8AC3E}">
+        <p14:creationId xmlns:p14="http://schemas.microsoft.com/office/powerpoint/2010/main" val="1416743523"/>
+      </p:ext>
+    </p:extLst>
+  </p:cSld>
+  <p:clrMapOvr>
+    <a:masterClrMapping/>
+  </p:clrMapOvr>
+</p:sld>
+</file>
+
+<file path=ppt/slides/slide26.xml><?xml version="1.0" encoding="utf-8"?>
+<p:sld xmlns:a="http://schemas.openxmlformats.org/drawingml/2006/main" xmlns:r="http://schemas.openxmlformats.org/officeDocument/2006/relationships" xmlns:p="http://schemas.openxmlformats.org/presentationml/2006/main">
+  <p:cSld>
+    <p:spTree>
+      <p:nvGrpSpPr>
+        <p:cNvPr id="1" name=""/>
+        <p:cNvGrpSpPr/>
+        <p:nvPr/>
+      </p:nvGrpSpPr>
+      <p:grpSpPr>
+        <a:xfrm>
+          <a:off x="0" y="0"/>
+          <a:ext cx="0" cy="0"/>
+          <a:chOff x="0" y="0"/>
+          <a:chExt cx="0" cy="0"/>
+        </a:xfrm>
+      </p:grpSpPr>
+      <p:sp>
+        <p:nvSpPr>
+          <p:cNvPr id="2" name="Title 1">
+            <a:extLst>
+              <a:ext uri="{FF2B5EF4-FFF2-40B4-BE49-F238E27FC236}">
+                <a16:creationId xmlns:a16="http://schemas.microsoft.com/office/drawing/2014/main" id="{00C2EA7C-8B85-9FB7-B2DE-19178A422C5C}"/>
+              </a:ext>
+            </a:extLst>
+          </p:cNvPr>
+          <p:cNvSpPr>
+            <a:spLocks noGrp="1"/>
+          </p:cNvSpPr>
+          <p:nvPr>
+            <p:ph type="title"/>
+          </p:nvPr>
+        </p:nvSpPr>
+        <p:spPr>
+          <a:xfrm>
+            <a:off x="838200" y="289248"/>
+            <a:ext cx="10515600" cy="1418254"/>
+          </a:xfrm>
+        </p:spPr>
+        <p:txBody>
+          <a:bodyPr>
+            <a:noAutofit/>
+          </a:bodyPr>
+          <a:lstStyle/>
+          <a:p>
+            <a:r>
+              <a:rPr lang="en-IN" b="1" dirty="0"/>
+              <a:t>Research Paper Status</a:t>
+            </a:r>
+            <a:br>
+              <a:rPr lang="en-IN" b="1" dirty="0"/>
+            </a:br>
+            <a:r>
+              <a:rPr lang="en-IN" sz="2400" dirty="0"/>
+              <a:t>Hyperlink of the paper-</a:t>
+            </a:r>
+            <a:r>
+              <a:rPr lang="en-US" sz="2000" dirty="0">
+                <a:hlinkClick r:id="rId2"/>
+              </a:rPr>
+              <a:t>https://drive.google.com/file/d/1jXVHia3ZSzDXlUtYf5FlCrGkNwD-bsYX/view?usp=sharing</a:t>
+            </a:r>
+            <a:endParaRPr lang="en-IN" sz="2000" dirty="0"/>
+          </a:p>
+        </p:txBody>
+      </p:sp>
+      <p:pic>
+        <p:nvPicPr>
+          <p:cNvPr id="5" name="Content Placeholder 4">
+            <a:extLst>
+              <a:ext uri="{FF2B5EF4-FFF2-40B4-BE49-F238E27FC236}">
+                <a16:creationId xmlns:a16="http://schemas.microsoft.com/office/drawing/2014/main" id="{7D0A7241-3264-CB24-D00B-C86D1424F15D}"/>
+              </a:ext>
+            </a:extLst>
+          </p:cNvPr>
+          <p:cNvPicPr>
+            <a:picLocks noGrp="1" noChangeAspect="1"/>
+          </p:cNvPicPr>
+          <p:nvPr>
+            <p:ph idx="1"/>
+          </p:nvPr>
+        </p:nvPicPr>
+        <p:blipFill>
+          <a:blip r:embed="rId3"/>
+          <a:stretch>
+            <a:fillRect/>
+          </a:stretch>
+        </p:blipFill>
+        <p:spPr>
+          <a:xfrm>
+            <a:off x="838200" y="1884785"/>
+            <a:ext cx="10515600" cy="4777271"/>
+          </a:xfrm>
+        </p:spPr>
+      </p:pic>
+    </p:spTree>
+    <p:extLst>
+      <p:ext uri="{BB962C8B-B14F-4D97-AF65-F5344CB8AC3E}">
+        <p14:creationId xmlns:p14="http://schemas.microsoft.com/office/powerpoint/2010/main" val="2021175809"/>
+      </p:ext>
+    </p:extLst>
+  </p:cSld>
+  <p:clrMapOvr>
+    <a:masterClrMapping/>
+  </p:clrMapOvr>
+</p:sld>
+</file>
+
+<file path=ppt/slides/slide27.xml><?xml version="1.0" encoding="utf-8"?>
+<p:sld xmlns:a="http://schemas.openxmlformats.org/drawingml/2006/main" xmlns:r="http://schemas.openxmlformats.org/officeDocument/2006/relationships" xmlns:p="http://schemas.openxmlformats.org/presentationml/2006/main">
+  <p:cSld>
+    <p:spTree>
+      <p:nvGrpSpPr>
+        <p:cNvPr id="1" name=""/>
+        <p:cNvGrpSpPr/>
+        <p:nvPr/>
+      </p:nvGrpSpPr>
+      <p:grpSpPr>
+        <a:xfrm>
+          <a:off x="0" y="0"/>
+          <a:ext cx="0" cy="0"/>
+          <a:chOff x="0" y="0"/>
+          <a:chExt cx="0" cy="0"/>
+        </a:xfrm>
+      </p:grpSpPr>
+      <p:sp>
+        <p:nvSpPr>
+          <p:cNvPr id="2" name="Title 1">
+            <a:extLst>
+              <a:ext uri="{FF2B5EF4-FFF2-40B4-BE49-F238E27FC236}">
+                <a16:creationId xmlns:a16="http://schemas.microsoft.com/office/drawing/2014/main" id="{5E0E81F4-DB51-FD53-61BC-ED64B1D349E3}"/>
+              </a:ext>
+            </a:extLst>
+          </p:cNvPr>
+          <p:cNvSpPr>
+            <a:spLocks noGrp="1"/>
+          </p:cNvSpPr>
+          <p:nvPr>
+            <p:ph type="title"/>
+          </p:nvPr>
+        </p:nvSpPr>
+        <p:spPr>
+          <a:xfrm>
+            <a:off x="838200" y="365125"/>
+            <a:ext cx="10515600" cy="2396736"/>
+          </a:xfrm>
+        </p:spPr>
+        <p:txBody>
+          <a:bodyPr>
+            <a:normAutofit/>
+          </a:bodyPr>
+          <a:lstStyle/>
+          <a:p>
+            <a:r>
+              <a:rPr lang="en-IN" b="1" dirty="0"/>
+              <a:t>Project Statues-</a:t>
+            </a:r>
+            <a:br>
+              <a:rPr lang="en-IN" b="1" dirty="0"/>
+            </a:br>
+            <a:br>
+              <a:rPr lang="en-IN" sz="2400" dirty="0">
+                <a:effectLst/>
+                <a:latin typeface="Calibri" panose="020F0502020204030204" pitchFamily="34" charset="0"/>
+                <a:ea typeface="Times New Roman" panose="02020603050405020304" pitchFamily="18" charset="0"/>
+                <a:cs typeface="Times New Roman" panose="02020603050405020304" pitchFamily="18" charset="0"/>
+              </a:rPr>
+            </a:br>
+            <a:r>
+              <a:rPr lang="en-IN" sz="2400" dirty="0">
+                <a:solidFill>
+                  <a:schemeClr val="accent5">
+                    <a:lumMod val="75000"/>
+                  </a:schemeClr>
+                </a:solidFill>
+                <a:effectLst/>
+                <a:latin typeface="Calibri" panose="020F0502020204030204" pitchFamily="34" charset="0"/>
+                <a:ea typeface="Times New Roman" panose="02020603050405020304" pitchFamily="18" charset="0"/>
+                <a:cs typeface="Times New Roman" panose="02020603050405020304" pitchFamily="18" charset="0"/>
+                <a:hlinkClick r:id="rId2">
+                  <a:extLst>
+                    <a:ext uri="{A12FA001-AC4F-418D-AE19-62706E023703}">
+                      <ahyp:hlinkClr xmlns:ahyp="http://schemas.microsoft.com/office/drawing/2018/hyperlinkcolor" val="tx"/>
+                    </a:ext>
+                  </a:extLst>
+                </a:hlinkClick>
+              </a:rPr>
+              <a:t>https://github.com/KIET-Github/CS-2024-C/tree/main/PCS24-8-Aakriti</a:t>
+            </a:r>
+            <a:endParaRPr lang="en-IN" sz="2400" b="1" dirty="0">
+              <a:solidFill>
+                <a:schemeClr val="accent5">
+                  <a:lumMod val="75000"/>
+                </a:schemeClr>
+              </a:solidFill>
+            </a:endParaRPr>
+          </a:p>
+        </p:txBody>
+      </p:sp>
+    </p:spTree>
+    <p:extLst>
+      <p:ext uri="{BB962C8B-B14F-4D97-AF65-F5344CB8AC3E}">
+        <p14:creationId xmlns:p14="http://schemas.microsoft.com/office/powerpoint/2010/main" val="160228924"/>
+      </p:ext>
+    </p:extLst>
+  </p:cSld>
+  <p:clrMapOvr>
+    <a:masterClrMapping/>
+  </p:clrMapOvr>
+</p:sld>
+</file>
+
+<file path=ppt/slides/slide28.xml><?xml version="1.0" encoding="utf-8"?>
+<p:sld xmlns:a="http://schemas.openxmlformats.org/drawingml/2006/main" xmlns:r="http://schemas.openxmlformats.org/officeDocument/2006/relationships" xmlns:p="http://schemas.openxmlformats.org/presentationml/2006/main">
+  <p:cSld>
+    <p:spTree>
+      <p:nvGrpSpPr>
+        <p:cNvPr id="1" name=""/>
+        <p:cNvGrpSpPr/>
+        <p:nvPr/>
+      </p:nvGrpSpPr>
+      <p:grpSpPr>
+        <a:xfrm>
+          <a:off x="0" y="0"/>
+          <a:ext cx="0" cy="0"/>
+          <a:chOff x="0" y="0"/>
+          <a:chExt cx="0" cy="0"/>
+        </a:xfrm>
+      </p:grpSpPr>
+      <p:sp>
+        <p:nvSpPr>
+          <p:cNvPr id="2" name="Title 1">
+            <a:extLst>
+              <a:ext uri="{FF2B5EF4-FFF2-40B4-BE49-F238E27FC236}">
+                <a16:creationId xmlns:a16="http://schemas.microsoft.com/office/drawing/2014/main" id="{3884C37B-A042-53C7-E648-EB5A2873D94B}"/>
+              </a:ext>
+            </a:extLst>
+          </p:cNvPr>
+          <p:cNvSpPr>
+            <a:spLocks noGrp="1"/>
+          </p:cNvSpPr>
+          <p:nvPr>
+            <p:ph type="title"/>
+          </p:nvPr>
+        </p:nvSpPr>
+        <p:spPr/>
+        <p:txBody>
+          <a:bodyPr>
+            <a:normAutofit/>
+          </a:bodyPr>
+          <a:lstStyle/>
+          <a:p>
+            <a:r>
+              <a:rPr lang="en-IN" b="1" dirty="0"/>
+              <a:t>All documents Proofs </a:t>
+            </a:r>
+          </a:p>
+        </p:txBody>
+      </p:sp>
+      <p:sp>
+        <p:nvSpPr>
+          <p:cNvPr id="4" name="TextBox 3">
+            <a:extLst>
+              <a:ext uri="{FF2B5EF4-FFF2-40B4-BE49-F238E27FC236}">
+                <a16:creationId xmlns:a16="http://schemas.microsoft.com/office/drawing/2014/main" id="{4D26CB93-D951-F9A0-CF14-A0BBF673391B}"/>
+              </a:ext>
+            </a:extLst>
+          </p:cNvPr>
+          <p:cNvSpPr txBox="1"/>
+          <p:nvPr/>
+        </p:nvSpPr>
+        <p:spPr>
+          <a:xfrm>
+            <a:off x="838200" y="1690688"/>
+            <a:ext cx="9705392" cy="923330"/>
+          </a:xfrm>
+          <a:prstGeom prst="rect">
+            <a:avLst/>
+          </a:prstGeom>
+          <a:noFill/>
+        </p:spPr>
+        <p:txBody>
+          <a:bodyPr wrap="square">
+            <a:spAutoFit/>
+          </a:bodyPr>
+          <a:lstStyle/>
+          <a:p>
+            <a:r>
+              <a:rPr lang="en-IN" dirty="0"/>
+              <a:t>1-Hyperlink of the testing report</a:t>
+            </a:r>
+          </a:p>
+          <a:p>
+            <a:r>
+              <a:rPr lang="en-IN" dirty="0">
+                <a:solidFill>
+                  <a:schemeClr val="accent5">
+                    <a:lumMod val="75000"/>
+                  </a:schemeClr>
+                </a:solidFill>
+                <a:hlinkClick r:id="rId2">
+                  <a:extLst>
+                    <a:ext uri="{A12FA001-AC4F-418D-AE19-62706E023703}">
+                      <ahyp:hlinkClr xmlns:ahyp="http://schemas.microsoft.com/office/drawing/2018/hyperlinkcolor" val="tx"/>
+                    </a:ext>
+                  </a:extLst>
+                </a:hlinkClick>
+              </a:rPr>
+              <a:t>https://docs.google.com/document/d/1j6pjD4dFtv3AIL8jatAe5PV8i4EHEZKw/edit?usp=sharing&amp;ouid=108444590373988136484&amp;rtpof=true&amp;sd=true</a:t>
+            </a:r>
+            <a:endParaRPr lang="en-IN" dirty="0">
+              <a:solidFill>
+                <a:schemeClr val="accent5">
+                  <a:lumMod val="75000"/>
+                </a:schemeClr>
+              </a:solidFill>
+            </a:endParaRPr>
+          </a:p>
+        </p:txBody>
+      </p:sp>
+      <p:sp>
+        <p:nvSpPr>
+          <p:cNvPr id="6" name="TextBox 5">
+            <a:extLst>
+              <a:ext uri="{FF2B5EF4-FFF2-40B4-BE49-F238E27FC236}">
+                <a16:creationId xmlns:a16="http://schemas.microsoft.com/office/drawing/2014/main" id="{77A16607-C257-21BD-5026-579AB529CCF7}"/>
+              </a:ext>
+            </a:extLst>
+          </p:cNvPr>
+          <p:cNvSpPr txBox="1"/>
+          <p:nvPr/>
+        </p:nvSpPr>
+        <p:spPr>
+          <a:xfrm>
+            <a:off x="838200" y="2646919"/>
+            <a:ext cx="10171922" cy="2585323"/>
+          </a:xfrm>
+          <a:prstGeom prst="rect">
+            <a:avLst/>
+          </a:prstGeom>
+          <a:noFill/>
+        </p:spPr>
+        <p:txBody>
+          <a:bodyPr wrap="square">
+            <a:spAutoFit/>
+          </a:bodyPr>
+          <a:lstStyle/>
+          <a:p>
+            <a:r>
+              <a:rPr lang="en-IN" dirty="0"/>
+              <a:t>2-Hyperlink of the Synopsis</a:t>
+            </a:r>
+          </a:p>
+          <a:p>
+            <a:r>
+              <a:rPr lang="en-IN" dirty="0">
+                <a:solidFill>
+                  <a:schemeClr val="accent5">
+                    <a:lumMod val="75000"/>
+                  </a:schemeClr>
+                </a:solidFill>
+                <a:hlinkClick r:id="rId3">
+                  <a:extLst>
+                    <a:ext uri="{A12FA001-AC4F-418D-AE19-62706E023703}">
+                      <ahyp:hlinkClr xmlns:ahyp="http://schemas.microsoft.com/office/drawing/2018/hyperlinkcolor" val="tx"/>
+                    </a:ext>
+                  </a:extLst>
+                </a:hlinkClick>
+              </a:rPr>
+              <a:t>https://docs.google.com/document/d/12b upoFvv5rtKwvdrfMxbFsAkLOvO6wm/edit?usp=sharing&amp;ouid=108444590373988136484&amp;rtpof=true&amp;sd=true</a:t>
+            </a:r>
+            <a:endParaRPr lang="en-IN" dirty="0">
+              <a:solidFill>
+                <a:schemeClr val="accent5">
+                  <a:lumMod val="75000"/>
+                </a:schemeClr>
+              </a:solidFill>
+            </a:endParaRPr>
+          </a:p>
+          <a:p>
+            <a:r>
+              <a:rPr lang="en-IN" dirty="0"/>
+              <a:t>3-Hyperlink of the SRS</a:t>
+            </a:r>
+          </a:p>
+          <a:p>
+            <a:r>
+              <a:rPr lang="en-IN" dirty="0">
+                <a:hlinkClick r:id="rId4"/>
+              </a:rPr>
+              <a:t>https://docs.google.com/document/d/1U3Cn5-qhQDScX_4lEnfvEphQ8riei_yv/edit?usp=sharing&amp;ouid=108444590373988136484&amp;rtpof=true&amp;sd=true</a:t>
+            </a:r>
+            <a:endParaRPr lang="en-IN" dirty="0"/>
+          </a:p>
+          <a:p>
+            <a:r>
+              <a:rPr lang="en-IN" dirty="0"/>
+              <a:t>4-Hyperlink of Report</a:t>
+            </a:r>
+          </a:p>
+          <a:p>
+            <a:r>
+              <a:rPr lang="en-IN" dirty="0">
+                <a:hlinkClick r:id="rId5"/>
+              </a:rPr>
+              <a:t>https://drive.google.com/file/d/1_bwy5Dn2TAQfFiKUKGg5y6pnjA-twwGA/view?usp=sharing</a:t>
+            </a:r>
+            <a:endParaRPr lang="en-IN" dirty="0"/>
+          </a:p>
+        </p:txBody>
+      </p:sp>
+    </p:spTree>
+    <p:extLst>
+      <p:ext uri="{BB962C8B-B14F-4D97-AF65-F5344CB8AC3E}">
+        <p14:creationId xmlns:p14="http://schemas.microsoft.com/office/powerpoint/2010/main" val="3776442475"/>
+      </p:ext>
+    </p:extLst>
+  </p:cSld>
+  <p:clrMapOvr>
+    <a:masterClrMapping/>
+  </p:clrMapOvr>
+</p:sld>
+</file>
+
+<file path=ppt/slides/slide29.xml><?xml version="1.0" encoding="utf-8"?>
+<p:sld xmlns:a="http://schemas.openxmlformats.org/drawingml/2006/main" xmlns:r="http://schemas.openxmlformats.org/officeDocument/2006/relationships" xmlns:p="http://schemas.openxmlformats.org/presentationml/2006/main">
+  <p:cSld>
+    <p:spTree>
+      <p:nvGrpSpPr>
+        <p:cNvPr id="1" name=""/>
+        <p:cNvGrpSpPr/>
+        <p:nvPr/>
+      </p:nvGrpSpPr>
+      <p:grpSpPr>
+        <a:xfrm>
+          <a:off x="0" y="0"/>
+          <a:ext cx="0" cy="0"/>
+          <a:chOff x="0" y="0"/>
+          <a:chExt cx="0" cy="0"/>
+        </a:xfrm>
+      </p:grpSpPr>
+      <p:sp>
+        <p:nvSpPr>
+          <p:cNvPr id="2" name="Title 1">
+            <a:extLst>
+              <a:ext uri="{FF2B5EF4-FFF2-40B4-BE49-F238E27FC236}">
                 <a16:creationId xmlns:a16="http://schemas.microsoft.com/office/drawing/2014/main" id="{5399170A-0FBE-5C45-B43F-5165573FA890}"/>
               </a:ext>
             </a:extLst>
@@ -6981,14 +7406,23 @@
             <p:ph type="title"/>
           </p:nvPr>
         </p:nvSpPr>
-        <p:spPr/>
+        <p:spPr>
+          <a:xfrm>
+            <a:off x="838200" y="0"/>
+            <a:ext cx="10515600" cy="1325563"/>
+          </a:xfrm>
+        </p:spPr>
         <p:txBody>
           <a:bodyPr/>
           <a:lstStyle/>
           <a:p>
             <a:r>
+              <a:rPr lang="en-IN" b="1" dirty="0"/>
+              <a:t>References</a:t>
+            </a:r>
+            <a:r>
               <a:rPr lang="en-IN" dirty="0"/>
-              <a:t>References	</a:t>
+              <a:t>	</a:t>
             </a:r>
           </a:p>
         </p:txBody>
@@ -7025,8 +7459,24 @@
               <a:buNone/>
             </a:pPr>
             <a:r>
-              <a:rPr lang="en-IN" sz="1000" dirty="0"/>
-              <a:t> [1] Soni J, Ansari U, Sharma D &amp; Soni S (2011). Predictive data mining for medical diagnosis: an overview of heart disease prediction. International Journal of Computer Applications, 17(8), 43-8 </a:t>
+              <a:rPr lang="en-IN" sz="1400" dirty="0"/>
+              <a:t>[1] A. S. D. M. ,. S. </a:t>
+            </a:r>
+            <a:r>
+              <a:rPr lang="en-IN" sz="1400" dirty="0" err="1"/>
+              <a:t>Mandakini</a:t>
+            </a:r>
+            <a:r>
+              <a:rPr lang="en-IN" sz="1400" dirty="0"/>
+              <a:t> </a:t>
+            </a:r>
+            <a:r>
+              <a:rPr lang="en-IN" sz="1400" dirty="0" err="1"/>
+              <a:t>Priyadarshani</a:t>
+            </a:r>
+            <a:r>
+              <a:rPr lang="en-IN" sz="1400" dirty="0"/>
+              <a:t> Behera, "A Hybrid Machine Learning algorithm for Heart and Liver Disease Prediction Using Modified Particle Swarm Optimization with," Procedia Computer Science, 2022.</a:t>
             </a:r>
           </a:p>
           <a:p>
@@ -7034,32 +7484,16 @@
               <a:buNone/>
             </a:pPr>
             <a:r>
-              <a:rPr lang="en-IN" sz="1000" dirty="0"/>
-              <a:t>[2] </a:t>
-            </a:r>
-            <a:r>
-              <a:rPr lang="en-IN" sz="1000" dirty="0" err="1"/>
-              <a:t>Dangare</a:t>
-            </a:r>
-            <a:r>
-              <a:rPr lang="en-IN" sz="1000" dirty="0"/>
-              <a:t> C S &amp; </a:t>
-            </a:r>
-            <a:r>
-              <a:rPr lang="en-IN" sz="1000" dirty="0" err="1"/>
-              <a:t>Apte</a:t>
-            </a:r>
-            <a:r>
-              <a:rPr lang="en-IN" sz="1000" dirty="0"/>
-              <a:t> S </a:t>
-            </a:r>
-            <a:r>
-              <a:rPr lang="en-IN" sz="1000" dirty="0" err="1"/>
-              <a:t>S</a:t>
-            </a:r>
-            <a:r>
-              <a:rPr lang="en-IN" sz="1000" dirty="0"/>
-              <a:t> (2012). Improved study of heart disease prediction system using data mining classification techniques. International Journal of Computer Applications, 47(10), 44-8.</a:t>
+              <a:rPr lang="en-IN" sz="1400" dirty="0"/>
+              <a:t>[2] M. </a:t>
+            </a:r>
+            <a:r>
+              <a:rPr lang="en-IN" sz="1400" dirty="0" err="1"/>
+              <a:t>SeYongJang</a:t>
+            </a:r>
+            <a:r>
+              <a:rPr lang="en-IN" sz="1400" dirty="0"/>
+              <a:t>, "Machine Learning Model Prediction of Mortality in Patients With and Without Heart Failure," JACC: Advances, vol. 2, 2023. </a:t>
             </a:r>
           </a:p>
           <a:p>
@@ -7067,8 +7501,16 @@
               <a:buNone/>
             </a:pPr>
             <a:r>
-              <a:rPr lang="en-IN" sz="1000" dirty="0"/>
-              <a:t> [3] Ordonez C (2006). Association rule discovery with the train and test approach for heart disease prediction. IEEE Transactions on Information Technology in Biomedicine, 10(2), 334-43. </a:t>
+              <a:rPr lang="en-IN" sz="1400" dirty="0"/>
+              <a:t>[3] A. L. P. B. P. V. R. K. Alireza </a:t>
+            </a:r>
+            <a:r>
+              <a:rPr lang="en-IN" sz="1400" dirty="0" err="1"/>
+              <a:t>Ghasemieh</a:t>
+            </a:r>
+            <a:r>
+              <a:rPr lang="en-IN" sz="1400" dirty="0"/>
+              <a:t>, "A Novel Machine Learning Model with Stacking Ensemble Learner for Predicting Emergency Readmission of Heart-Disease Patients," Decision Analytics Journal, 2023. </a:t>
             </a:r>
           </a:p>
           <a:p>
@@ -7076,8 +7518,8 @@
               <a:buNone/>
             </a:pPr>
             <a:r>
-              <a:rPr lang="en-IN" sz="1000" dirty="0"/>
-              <a:t>[4] Shinde R, Arjun S, Patil P &amp; Waghmare J (2015). An intelligent heart disease prediction system using k-means clustering and Naïve Bayes algorithm. International Journal of Computer Science and Information Technologies, 6(1), 637-9.</a:t>
+              <a:rPr lang="en-US" sz="1400" dirty="0"/>
+              <a:t>[4] 1. ,. Y. R. a. ,. H. Y. a. ,. Y. D. b. ,. Y. L. a. ,. Y. Y. a. ,. A. M. a. ,. T. Y. d. ,. Y. W. c. ,. F. X. c. ,. Q. H. e. Y. Z. a. Yue Huang a, "Using a machine learning-based risk prediction model to analyze the coronary artery calcification score and predict coronary heart disease and risk assessment," Computers in Biology and Medicine, 2022. </a:t>
             </a:r>
           </a:p>
           <a:p>
@@ -7085,16 +7527,16 @@
               <a:buNone/>
             </a:pPr>
             <a:r>
-              <a:rPr lang="en-IN" sz="1000" dirty="0"/>
-              <a:t> [5] Bashir S, Qamar U &amp; Javed M Y (2014, November). An ensemble-based decision support framework for intelligent heart disease diagnosis. In International Conference on Information Society (</a:t>
-            </a:r>
-            <a:r>
-              <a:rPr lang="en-IN" sz="1000" dirty="0" err="1"/>
-              <a:t>i</a:t>
-            </a:r>
-            <a:r>
-              <a:rPr lang="en-IN" sz="1000" dirty="0"/>
-              <a:t>-Society 2014) (pp. 259-64). IEEE. ICCRDA 2020 IOP Conf. Series: Materials Science and Engineering 1022 (2021) 012072 IOP Publishing doi:10.1088/1757-899X/1022/1/012072 9 </a:t>
+              <a:rPr lang="en-US" sz="1400" dirty="0"/>
+              <a:t>[5] C.-k. T. b. C.-J. W. b. S.-H. C. b. Y.-S. H. b. L.-J. K. b. Chun-Ling Lin a, "Title-Development of smart cardiovascular measurement system using feature selection and machine learning models for prediction of sleep deprivation, cold hands and feet, and </a:t>
+            </a:r>
+            <a:r>
+              <a:rPr lang="en-US" sz="1400" dirty="0" err="1"/>
+              <a:t>Shanghuo</a:t>
+            </a:r>
+            <a:r>
+              <a:rPr lang="en-US" sz="1400" dirty="0"/>
+              <a:t> syndrome," International Measurement Confederation , 2023. </a:t>
             </a:r>
           </a:p>
           <a:p>
@@ -7102,8 +7544,8 @@
               <a:buNone/>
             </a:pPr>
             <a:r>
-              <a:rPr lang="en-IN" sz="1000" dirty="0"/>
-              <a:t>[6] Jee S H, Jang Y, Oh D J, Oh B H, Lee S H, Park S W &amp; Yun Y D (2014). A coronary heart disease prediction model: the Korean Heart Study. BMJ open, 4(5), e005025.</a:t>
+              <a:rPr lang="en-US" sz="1400" dirty="0"/>
+              <a:t>[6] V. S. A.-D. b. ,. N. M. c. ,. A. A. H. d. ,. I. M. a. ,. S. A. e. ,. K. F. A.-t. f. ,. K. A. g. ,. F. M. B. g. ,. M. A. M. Md. Mamun Ali a, "Machine Learning Approach for Risk Factors Analysis and Survival Prediction of Heart Failure Patients," Healthcare Analytics, 2023. </a:t>
             </a:r>
           </a:p>
           <a:p>
@@ -7111,40 +7553,16 @@
               <a:buNone/>
             </a:pPr>
             <a:r>
-              <a:rPr lang="en-IN" sz="1000" dirty="0"/>
-              <a:t>[7] </a:t>
-            </a:r>
-            <a:r>
-              <a:rPr lang="en-IN" sz="1000" dirty="0" err="1"/>
-              <a:t>Ganna</a:t>
-            </a:r>
-            <a:r>
-              <a:rPr lang="en-IN" sz="1000" dirty="0"/>
-              <a:t> A, Magnusson P K, Pedersen N L, de Faire U, Reilly M, </a:t>
-            </a:r>
-            <a:r>
-              <a:rPr lang="en-IN" sz="1000" dirty="0" err="1"/>
-              <a:t>Ärnlöv</a:t>
-            </a:r>
-            <a:r>
-              <a:rPr lang="en-IN" sz="1000" dirty="0"/>
-              <a:t> J &amp; </a:t>
-            </a:r>
-            <a:r>
-              <a:rPr lang="en-IN" sz="1000" dirty="0" err="1"/>
-              <a:t>Ingelsson</a:t>
-            </a:r>
-            <a:r>
-              <a:rPr lang="en-IN" sz="1000" dirty="0"/>
-              <a:t> E (2013). </a:t>
-            </a:r>
-            <a:r>
-              <a:rPr lang="en-IN" sz="1000" dirty="0" err="1"/>
-              <a:t>Multilocus</a:t>
-            </a:r>
-            <a:r>
-              <a:rPr lang="en-IN" sz="1000" dirty="0"/>
-              <a:t> genetic risk scores for coronary heart disease prediction. Arteriosclerosis, thrombosis, and vascular biology, 33(9), 2267-72.</a:t>
+              <a:rPr lang="en-US" sz="1400" dirty="0"/>
+              <a:t>[7] L. V. R. G. </a:t>
+            </a:r>
+            <a:r>
+              <a:rPr lang="en-US" sz="1400" dirty="0" err="1"/>
+              <a:t>Stojanov</a:t>
+            </a:r>
+            <a:r>
+              <a:rPr lang="en-US" sz="1400" dirty="0"/>
+              <a:t>, ": Machine Learning-Based Predictive Models for Heart Disease Diagnosis," King Saud University, 2023. </a:t>
             </a:r>
           </a:p>
           <a:p>
@@ -7152,32 +7570,16 @@
               <a:buNone/>
             </a:pPr>
             <a:r>
-              <a:rPr lang="en-IN" sz="1000" dirty="0"/>
-              <a:t> [8] Jabbar M A, </a:t>
-            </a:r>
-            <a:r>
-              <a:rPr lang="en-IN" sz="1000" dirty="0" err="1"/>
-              <a:t>Deekshatulu</a:t>
-            </a:r>
-            <a:r>
-              <a:rPr lang="en-IN" sz="1000" dirty="0"/>
-              <a:t> B L &amp; Chandra P (2013, March). Heart disease prediction using lazy associative classification. In 2013 International </a:t>
-            </a:r>
-            <a:r>
-              <a:rPr lang="en-IN" sz="1000" dirty="0" err="1"/>
-              <a:t>Mutli</a:t>
-            </a:r>
-            <a:r>
-              <a:rPr lang="en-IN" sz="1000" dirty="0"/>
-              <a:t>-Conference on Automation, </a:t>
-            </a:r>
-            <a:r>
-              <a:rPr lang="en-IN" sz="1000" dirty="0" err="1"/>
-              <a:t>Computing,Communication</a:t>
-            </a:r>
-            <a:r>
-              <a:rPr lang="en-IN" sz="1000" dirty="0"/>
-              <a:t>, Control and Compressed Sensing (iMac4s) (pp. 40- 6). IEEE. </a:t>
+              <a:rPr lang="en-US" sz="1400" dirty="0"/>
+              <a:t>[8] S. M. P. K. P. S. M. </a:t>
+            </a:r>
+            <a:r>
+              <a:rPr lang="en-US" sz="1400" dirty="0" err="1"/>
+              <a:t>Subasish</a:t>
+            </a:r>
+            <a:r>
+              <a:rPr lang="en-US" sz="1400" dirty="0"/>
+              <a:t> Mohapatra, "Heart Diseases Prediction based on Stacking Classifiers Model," International Conference on Machine Learning and Data Engineering, 2023. </a:t>
             </a:r>
           </a:p>
           <a:p>
@@ -7185,40 +7587,8 @@
               <a:buNone/>
             </a:pPr>
             <a:r>
-              <a:rPr lang="en-IN" sz="1000" dirty="0"/>
-              <a:t>[9] </a:t>
-            </a:r>
-            <a:r>
-              <a:rPr lang="en-IN" sz="1000" dirty="0" err="1"/>
-              <a:t>Dangare</a:t>
-            </a:r>
-            <a:r>
-              <a:rPr lang="en-IN" sz="1000" dirty="0"/>
-              <a:t> </a:t>
-            </a:r>
-            <a:r>
-              <a:rPr lang="en-IN" sz="1000" dirty="0" err="1"/>
-              <a:t>Chaitrali</a:t>
-            </a:r>
-            <a:r>
-              <a:rPr lang="en-IN" sz="1000" dirty="0"/>
-              <a:t> S and </a:t>
-            </a:r>
-            <a:r>
-              <a:rPr lang="en-IN" sz="1000" dirty="0" err="1"/>
-              <a:t>Sulabha</a:t>
-            </a:r>
-            <a:r>
-              <a:rPr lang="en-IN" sz="1000" dirty="0"/>
-              <a:t> S </a:t>
-            </a:r>
-            <a:r>
-              <a:rPr lang="en-IN" sz="1000" dirty="0" err="1"/>
-              <a:t>Apte</a:t>
-            </a:r>
-            <a:r>
-              <a:rPr lang="en-IN" sz="1000" dirty="0"/>
-              <a:t>. "Improved study of heart disease prediction system using data mining classification techniques." International Journal of Computer Applications 47.</a:t>
+              <a:rPr lang="en-US" sz="1400" dirty="0"/>
+              <a:t>[9] A. C. A. R. W. E. E. Qi Li, "Automating Cardiovascular Disease Prediction Using Machine Learning and EMR Data," International Journal of Medical Informatics, 2022. </a:t>
             </a:r>
           </a:p>
           <a:p>
@@ -7226,143 +7596,26 @@
               <a:buNone/>
             </a:pPr>
             <a:r>
-              <a:rPr lang="en-IN" sz="1000" dirty="0"/>
-              <a:t>10 (2012): 44-8. [10] Soni Jyoti. "Predictive data mining for medical diagnosis: An overview of heart disease prediction." International Journal of Computer Applications 17.8 (2011): 43-8. </a:t>
-            </a:r>
-          </a:p>
-          <a:p>
-            <a:pPr marL="0" indent="0">
-              <a:buNone/>
-            </a:pPr>
-            <a:r>
-              <a:rPr lang="en-IN" sz="1000" dirty="0"/>
-              <a:t>[11] Chen A H, Huang S Y, Hong P S, Cheng C H &amp; Lin E J (2011, September). HDPS: Heart disease prediction system. In 2011 Computing in Cardiology (pp. 557-60). IEEE. </a:t>
-            </a:r>
-          </a:p>
-          <a:p>
-            <a:pPr marL="0" indent="0">
-              <a:buNone/>
-            </a:pPr>
-            <a:r>
-              <a:rPr lang="en-IN" sz="1000" dirty="0"/>
-              <a:t>[12] Parthiban, Latha and R Subramanian. "Intelligent heart disease prediction system using CANFIS and genetic algorithm." International Journal of Biological, Biomedical and Medical Sciences 3.3 (2008). </a:t>
-            </a:r>
-          </a:p>
-          <a:p>
-            <a:pPr marL="0" indent="0">
-              <a:buNone/>
-            </a:pPr>
-            <a:r>
-              <a:rPr lang="en-IN" sz="1000" dirty="0"/>
-              <a:t>[13] Wolgast G, </a:t>
-            </a:r>
-            <a:r>
-              <a:rPr lang="en-IN" sz="1000" dirty="0" err="1"/>
-              <a:t>Ehrenborg</a:t>
-            </a:r>
-            <a:r>
-              <a:rPr lang="en-IN" sz="1000" dirty="0"/>
-              <a:t> C, </a:t>
-            </a:r>
-            <a:r>
-              <a:rPr lang="en-IN" sz="1000" dirty="0" err="1"/>
-              <a:t>Israelsson</a:t>
-            </a:r>
-            <a:r>
-              <a:rPr lang="en-IN" sz="1000" dirty="0"/>
-              <a:t> A, </a:t>
-            </a:r>
-            <a:r>
-              <a:rPr lang="en-IN" sz="1000" dirty="0" err="1"/>
-              <a:t>Helander</a:t>
-            </a:r>
-            <a:r>
-              <a:rPr lang="en-IN" sz="1000" dirty="0"/>
-              <a:t> J, Johansson E &amp; </a:t>
-            </a:r>
-            <a:r>
-              <a:rPr lang="en-IN" sz="1000" dirty="0" err="1"/>
-              <a:t>Manefjord</a:t>
-            </a:r>
-            <a:r>
-              <a:rPr lang="en-IN" sz="1000" dirty="0"/>
-              <a:t> H (2016). Wireless body area network for heart attack detection [Education Corner]. IEEE antennas and propagation magazine, 58(5), 84-92.</a:t>
-            </a:r>
-          </a:p>
-          <a:p>
-            <a:pPr marL="0" indent="0">
-              <a:buNone/>
-            </a:pPr>
-            <a:r>
-              <a:rPr lang="en-IN" sz="1000" dirty="0"/>
-              <a:t>[14] Patel S &amp; Chauhan Y (2014). Heart attack detection and medical attention using motion sensing device -</a:t>
-            </a:r>
-            <a:r>
-              <a:rPr lang="en-IN" sz="1000" dirty="0" err="1"/>
-              <a:t>kinect</a:t>
-            </a:r>
-            <a:r>
-              <a:rPr lang="en-IN" sz="1000" dirty="0"/>
-              <a:t>. International Journal of Scientific and Research Publications, 4(1), 1-4.</a:t>
-            </a:r>
-          </a:p>
-          <a:p>
-            <a:pPr marL="0" indent="0">
-              <a:buNone/>
-            </a:pPr>
-            <a:r>
-              <a:rPr lang="en-IN" sz="1000" dirty="0"/>
-              <a:t> [15] Zhang Y, </a:t>
-            </a:r>
-            <a:r>
-              <a:rPr lang="en-IN" sz="1000" dirty="0" err="1"/>
-              <a:t>Fogoros</a:t>
-            </a:r>
-            <a:r>
-              <a:rPr lang="en-IN" sz="1000" dirty="0"/>
-              <a:t> R, Thompson J, </a:t>
-            </a:r>
-            <a:r>
-              <a:rPr lang="en-IN" sz="1000" dirty="0" err="1"/>
-              <a:t>Kenknight</a:t>
-            </a:r>
-            <a:r>
-              <a:rPr lang="en-IN" sz="1000" dirty="0"/>
-              <a:t> B H, Pederson M J, </a:t>
-            </a:r>
-            <a:r>
-              <a:rPr lang="en-IN" sz="1000" dirty="0" err="1"/>
-              <a:t>Patangay</a:t>
-            </a:r>
-            <a:r>
-              <a:rPr lang="en-IN" sz="1000" dirty="0"/>
-              <a:t> A &amp; Mazar S T (2011). U.S. Patent No. 8,014,863. Washington, DC: U.S. Patent and Trademark Office. </a:t>
-            </a:r>
-          </a:p>
-          <a:p>
-            <a:pPr marL="0" indent="0">
-              <a:buNone/>
-            </a:pPr>
-            <a:r>
-              <a:rPr lang="en-IN" sz="1000" dirty="0"/>
-              <a:t>[16] Raihan M, Mondal S, More A, </a:t>
-            </a:r>
-            <a:r>
-              <a:rPr lang="en-IN" sz="1000" dirty="0" err="1"/>
-              <a:t>Sagor</a:t>
-            </a:r>
-            <a:r>
-              <a:rPr lang="en-IN" sz="1000" dirty="0"/>
-              <a:t> M O F, </a:t>
-            </a:r>
-            <a:r>
-              <a:rPr lang="en-IN" sz="1000" dirty="0" err="1"/>
-              <a:t>Sikder</a:t>
-            </a:r>
-            <a:r>
-              <a:rPr lang="en-IN" sz="1000" dirty="0"/>
-              <a:t> G, Majumder M A &amp; Ghosh K (2016, December). Smartphone based ischemic heart disease (heart attack) risk prediction using clinical data and data mining approaches, a prototype design. In 2016 19th International Conference on Computer and Information Technology (ICCIT) (pp. 299-303). IEEE. </a:t>
-            </a:r>
+              <a:rPr lang="en-US" sz="1400" dirty="0"/>
+              <a:t>[10] R. R. N. Y. N. B. S. K. D. </a:t>
+            </a:r>
+            <a:r>
+              <a:rPr lang="en-US" sz="1400" dirty="0" err="1"/>
+              <a:t>Khandaker</a:t>
+            </a:r>
+            <a:r>
+              <a:rPr lang="en-US" sz="1400" dirty="0"/>
+              <a:t> Mohammad </a:t>
+            </a:r>
+            <a:r>
+              <a:rPr lang="en-US" sz="1400" dirty="0" err="1"/>
+              <a:t>Mohi</a:t>
+            </a:r>
+            <a:r>
+              <a:rPr lang="en-US" sz="1400" dirty="0"/>
+              <a:t> Uddin, "Machine Learning-Based Approach to the Diagnosis of Cardiovascular Disease Using a Combined Dataset," Intelligence-Based Medicine, 2023. </a:t>
+            </a:r>
+            <a:endParaRPr lang="en-IN" sz="1400" dirty="0"/>
           </a:p>
         </p:txBody>
       </p:sp>
@@ -7418,7 +7671,7 @@
           <a:lstStyle/>
           <a:p>
             <a:r>
-              <a:rPr lang="en-IN" dirty="0"/>
+              <a:rPr lang="en-IN" b="1" dirty="0"/>
               <a:t>Objectives</a:t>
             </a:r>
           </a:p>
@@ -7440,7 +7693,12 @@
             <p:ph idx="1"/>
           </p:nvPr>
         </p:nvSpPr>
-        <p:spPr/>
+        <p:spPr>
+          <a:xfrm>
+            <a:off x="838200" y="1690688"/>
+            <a:ext cx="10515600" cy="4486275"/>
+          </a:xfrm>
+        </p:spPr>
         <p:txBody>
           <a:bodyPr/>
           <a:lstStyle/>
@@ -7521,12 +7779,12 @@
         </p:spPr>
         <p:txBody>
           <a:bodyPr>
-            <a:normAutofit fontScale="90000"/>
+            <a:noAutofit/>
           </a:bodyPr>
           <a:lstStyle/>
           <a:p>
             <a:r>
-              <a:rPr lang="en-IN" dirty="0"/>
+              <a:rPr lang="en-IN" b="1" dirty="0"/>
               <a:t>Technology Used	</a:t>
             </a:r>
           </a:p>
@@ -7655,7 +7913,7 @@
             </a:r>
             <a:r>
               <a:rPr lang="en-IN" sz="5100" dirty="0" err="1"/>
-              <a:t>Neighbors</a:t>
+              <a:t>Neighbor</a:t>
             </a:r>
             <a:r>
               <a:rPr lang="en-IN" sz="5100" dirty="0"/>
@@ -7739,8 +7997,12 @@
           <a:lstStyle/>
           <a:p>
             <a:r>
+              <a:rPr lang="en-IN" b="1" dirty="0"/>
+              <a:t>Literature Survey-1</a:t>
+            </a:r>
+            <a:r>
               <a:rPr lang="en-IN" dirty="0"/>
-              <a:t>Literature Survey-1	</a:t>
+              <a:t>	</a:t>
             </a:r>
           </a:p>
         </p:txBody>
@@ -7763,8 +8025,8 @@
         </p:nvSpPr>
         <p:spPr>
           <a:xfrm>
-            <a:off x="838200" y="819863"/>
-            <a:ext cx="10515600" cy="5831633"/>
+            <a:off x="838200" y="1212980"/>
+            <a:ext cx="10515600" cy="5438516"/>
           </a:xfrm>
         </p:spPr>
         <p:txBody>
@@ -7965,8 +8227,12 @@
           <a:lstStyle/>
           <a:p>
             <a:r>
+              <a:rPr lang="en-IN" b="1" dirty="0"/>
+              <a:t>Literature Survey-2</a:t>
+            </a:r>
+            <a:r>
               <a:rPr lang="en-IN" dirty="0"/>
-              <a:t>Literature Survey-2	</a:t>
+              <a:t>	</a:t>
             </a:r>
           </a:p>
         </p:txBody>
@@ -7989,8 +8255,8 @@
         </p:nvSpPr>
         <p:spPr>
           <a:xfrm>
-            <a:off x="933060" y="690464"/>
-            <a:ext cx="10767527" cy="5990254"/>
+            <a:off x="933060" y="989044"/>
+            <a:ext cx="10767527" cy="5691673"/>
           </a:xfrm>
         </p:spPr>
         <p:txBody>
@@ -8151,8 +8417,12 @@
           <a:lstStyle/>
           <a:p>
             <a:r>
+              <a:rPr lang="en-IN" sz="4900" b="1" dirty="0"/>
+              <a:t>Literature Survey-3</a:t>
+            </a:r>
+            <a:r>
               <a:rPr lang="en-IN" dirty="0"/>
-              <a:t>Literature Survey-3	</a:t>
+              <a:t>	</a:t>
             </a:r>
           </a:p>
         </p:txBody>
@@ -8175,8 +8445,8 @@
         </p:nvSpPr>
         <p:spPr>
           <a:xfrm>
-            <a:off x="838200" y="839754"/>
-            <a:ext cx="10515600" cy="5821071"/>
+            <a:off x="838200" y="1045029"/>
+            <a:ext cx="10515600" cy="5615796"/>
           </a:xfrm>
         </p:spPr>
         <p:txBody>
@@ -8394,8 +8664,12 @@
           <a:lstStyle/>
           <a:p>
             <a:r>
+              <a:rPr lang="en-IN" b="1" dirty="0"/>
+              <a:t>Literature Survey-4</a:t>
+            </a:r>
+            <a:r>
               <a:rPr lang="en-IN" dirty="0"/>
-              <a:t>Literature Survey-4	</a:t>
+              <a:t>	</a:t>
             </a:r>
           </a:p>
         </p:txBody>
@@ -8418,8 +8692,8 @@
         </p:nvSpPr>
         <p:spPr>
           <a:xfrm>
-            <a:off x="838200" y="914400"/>
-            <a:ext cx="10590245" cy="5756988"/>
+            <a:off x="838200" y="1147664"/>
+            <a:ext cx="10590245" cy="5523723"/>
           </a:xfrm>
         </p:spPr>
         <p:txBody>
@@ -8687,7 +8961,7 @@
           <a:lstStyle/>
           <a:p>
             <a:r>
-              <a:rPr lang="en-IN" dirty="0"/>
+              <a:rPr lang="en-IN" b="1" dirty="0"/>
               <a:t>Literature Survey-5	</a:t>
             </a:r>
           </a:p>
@@ -8711,8 +8985,8 @@
         </p:nvSpPr>
         <p:spPr>
           <a:xfrm>
-            <a:off x="838200" y="951721"/>
-            <a:ext cx="10515600" cy="6074229"/>
+            <a:off x="838200" y="1240971"/>
+            <a:ext cx="10515600" cy="5784979"/>
           </a:xfrm>
         </p:spPr>
         <p:txBody>

</xml_diff>